<commit_message>
Generators And Promises Added
</commit_message>
<xml_diff>
--- a/CucumberJS_Protractor.pptx
+++ b/CucumberJS_Protractor.pptx
@@ -5,10 +5,10 @@
     <p:sldMasterId id="2147483699" r:id="rId4"/>
   </p:sldMasterIdLst>
   <p:notesMasterIdLst>
-    <p:notesMasterId r:id="rId24"/>
+    <p:notesMasterId r:id="rId27"/>
   </p:notesMasterIdLst>
   <p:handoutMasterIdLst>
-    <p:handoutMasterId r:id="rId25"/>
+    <p:handoutMasterId r:id="rId28"/>
   </p:handoutMasterIdLst>
   <p:sldIdLst>
     <p:sldId id="281" r:id="rId5"/>
@@ -22,14 +22,17 @@
     <p:sldId id="310" r:id="rId13"/>
     <p:sldId id="311" r:id="rId14"/>
     <p:sldId id="312" r:id="rId15"/>
-    <p:sldId id="297" r:id="rId16"/>
-    <p:sldId id="300" r:id="rId17"/>
-    <p:sldId id="303" r:id="rId18"/>
-    <p:sldId id="295" r:id="rId19"/>
-    <p:sldId id="304" r:id="rId20"/>
-    <p:sldId id="305" r:id="rId21"/>
-    <p:sldId id="306" r:id="rId22"/>
-    <p:sldId id="298" r:id="rId23"/>
+    <p:sldId id="313" r:id="rId16"/>
+    <p:sldId id="314" r:id="rId17"/>
+    <p:sldId id="315" r:id="rId18"/>
+    <p:sldId id="297" r:id="rId19"/>
+    <p:sldId id="300" r:id="rId20"/>
+    <p:sldId id="303" r:id="rId21"/>
+    <p:sldId id="295" r:id="rId22"/>
+    <p:sldId id="304" r:id="rId23"/>
+    <p:sldId id="305" r:id="rId24"/>
+    <p:sldId id="306" r:id="rId25"/>
+    <p:sldId id="298" r:id="rId26"/>
   </p:sldIdLst>
   <p:sldSz cx="12192000" cy="6858000"/>
   <p:notesSz cx="7099300" cy="10234613"/>
@@ -243,7 +246,7 @@
           <a:p>
             <a:fld id="{F4985468-EA09-47E3-8036-5BF84197CAEF}" type="datetimeFigureOut">
               <a:rPr lang="en-GB" smtClean="0"/>
-              <a:t>04/10/2017</a:t>
+              <a:t>08/10/2017</a:t>
             </a:fld>
             <a:endParaRPr lang="en-GB" dirty="0"/>
           </a:p>
@@ -408,7 +411,7 @@
           <a:p>
             <a:fld id="{C303BD5E-F603-431C-B79D-697385AE35AF}" type="datetimeFigureOut">
               <a:rPr lang="en-GB" smtClean="0"/>
-              <a:t>04/10/2017</a:t>
+              <a:t>08/10/2017</a:t>
             </a:fld>
             <a:endParaRPr lang="en-GB" dirty="0"/>
           </a:p>
@@ -11910,19 +11913,7 @@
             </a:r>
             <a:r>
               <a:rPr lang="en-US" dirty="0" smtClean="0"/>
-              <a:t> testing , </a:t>
-            </a:r>
-            <a:r>
-              <a:rPr lang="en-US" dirty="0" smtClean="0"/>
-              <a:t>October</a:t>
-            </a:r>
-            <a:r>
-              <a:rPr lang="en-US" dirty="0" smtClean="0"/>
-              <a:t> </a:t>
-            </a:r>
-            <a:r>
-              <a:rPr lang="en-US" dirty="0" smtClean="0"/>
-              <a:t>2017</a:t>
+              <a:t> testing , October 2017</a:t>
             </a:r>
             <a:endParaRPr lang="en-GB" dirty="0"/>
           </a:p>
@@ -13157,6 +13148,1884 @@
 </file>
 
 <file path=ppt/slides/slide12.xml><?xml version="1.0" encoding="utf-8"?>
+<p:sld xmlns:a="http://schemas.openxmlformats.org/drawingml/2006/main" xmlns:r="http://schemas.openxmlformats.org/officeDocument/2006/relationships" xmlns:p="http://schemas.openxmlformats.org/presentationml/2006/main">
+  <p:cSld>
+    <p:spTree>
+      <p:nvGrpSpPr>
+        <p:cNvPr id="1" name=""/>
+        <p:cNvGrpSpPr/>
+        <p:nvPr/>
+      </p:nvGrpSpPr>
+      <p:grpSpPr>
+        <a:xfrm>
+          <a:off x="0" y="0"/>
+          <a:ext cx="0" cy="0"/>
+          <a:chOff x="0" y="0"/>
+          <a:chExt cx="0" cy="0"/>
+        </a:xfrm>
+      </p:grpSpPr>
+      <p:sp>
+        <p:nvSpPr>
+          <p:cNvPr id="2" name="Title 1"/>
+          <p:cNvSpPr>
+            <a:spLocks noGrp="1"/>
+          </p:cNvSpPr>
+          <p:nvPr>
+            <p:ph type="title"/>
+          </p:nvPr>
+        </p:nvSpPr>
+        <p:spPr/>
+        <p:txBody>
+          <a:bodyPr/>
+          <a:lstStyle/>
+          <a:p>
+            <a:r>
+              <a:rPr lang="en-GB" dirty="0" smtClean="0"/>
+              <a:t>Java Script + es6</a:t>
+            </a:r>
+            <a:endParaRPr lang="en-GB" dirty="0"/>
+          </a:p>
+        </p:txBody>
+      </p:sp>
+      <p:sp>
+        <p:nvSpPr>
+          <p:cNvPr id="5" name="Content Placeholder 4"/>
+          <p:cNvSpPr>
+            <a:spLocks noGrp="1"/>
+          </p:cNvSpPr>
+          <p:nvPr>
+            <p:ph idx="20"/>
+          </p:nvPr>
+        </p:nvSpPr>
+        <p:spPr>
+          <a:xfrm>
+            <a:off x="829483" y="1585571"/>
+            <a:ext cx="10594675" cy="338554"/>
+          </a:xfrm>
+        </p:spPr>
+        <p:txBody>
+          <a:bodyPr/>
+          <a:lstStyle/>
+          <a:p>
+            <a:pPr algn="ctr"/>
+            <a:r>
+              <a:rPr lang="en-US" dirty="0" smtClean="0">
+                <a:solidFill>
+                  <a:srgbClr val="FF0000"/>
+                </a:solidFill>
+              </a:rPr>
+              <a:t>PROMISE</a:t>
+            </a:r>
+            <a:endParaRPr lang="en-GB" dirty="0">
+              <a:solidFill>
+                <a:srgbClr val="FF0000"/>
+              </a:solidFill>
+            </a:endParaRPr>
+          </a:p>
+        </p:txBody>
+      </p:sp>
+      <p:sp>
+        <p:nvSpPr>
+          <p:cNvPr id="14" name="TextBox 13"/>
+          <p:cNvSpPr txBox="1"/>
+          <p:nvPr/>
+        </p:nvSpPr>
+        <p:spPr>
+          <a:xfrm>
+            <a:off x="4361358" y="5343494"/>
+            <a:ext cx="1113576" cy="407310"/>
+          </a:xfrm>
+          <a:prstGeom prst="rect">
+            <a:avLst/>
+          </a:prstGeom>
+          <a:noFill/>
+        </p:spPr>
+        <p:txBody>
+          <a:bodyPr wrap="square" rtlCol="0">
+            <a:spAutoFit/>
+          </a:bodyPr>
+          <a:lstStyle/>
+          <a:p>
+            <a:pPr algn="ctr"/>
+            <a:r>
+              <a:rPr lang="en-US" sz="2000" b="1" spc="-150" dirty="0" smtClean="0">
+                <a:solidFill>
+                  <a:schemeClr val="bg1"/>
+                </a:solidFill>
+                <a:latin typeface="Arial Narrow" charset="0"/>
+                <a:ea typeface="Arial Narrow" charset="0"/>
+                <a:cs typeface="Arial Narrow" charset="0"/>
+              </a:rPr>
+              <a:t>TEXT</a:t>
+            </a:r>
+            <a:endParaRPr lang="en-GB" sz="2000" b="1" spc="-150" dirty="0">
+              <a:solidFill>
+                <a:schemeClr val="bg1"/>
+              </a:solidFill>
+              <a:latin typeface="Arial Narrow" charset="0"/>
+              <a:ea typeface="Arial Narrow" charset="0"/>
+              <a:cs typeface="Arial Narrow" charset="0"/>
+            </a:endParaRPr>
+          </a:p>
+        </p:txBody>
+      </p:sp>
+      <p:sp>
+        <p:nvSpPr>
+          <p:cNvPr id="16" name="Content Placeholder 7"/>
+          <p:cNvSpPr txBox="1">
+            <a:spLocks/>
+          </p:cNvSpPr>
+          <p:nvPr/>
+        </p:nvSpPr>
+        <p:spPr>
+          <a:xfrm>
+            <a:off x="6381366" y="5225114"/>
+            <a:ext cx="2277801" cy="448637"/>
+          </a:xfrm>
+          <a:prstGeom prst="rect">
+            <a:avLst/>
+          </a:prstGeom>
+        </p:spPr>
+        <p:txBody>
+          <a:bodyPr vert="horz" lIns="0" tIns="0" rIns="0" bIns="45720" rtlCol="0" anchor="b" anchorCtr="0">
+            <a:normAutofit/>
+          </a:bodyPr>
+          <a:lstStyle>
+            <a:lvl1pPr marL="0" marR="0" indent="0" algn="l" defTabSz="914400" rtl="0" eaLnBrk="1" fontAlgn="auto" latinLnBrk="0" hangingPunct="1">
+              <a:lnSpc>
+                <a:spcPct val="90000"/>
+              </a:lnSpc>
+              <a:spcBef>
+                <a:spcPts val="1000"/>
+              </a:spcBef>
+              <a:spcAft>
+                <a:spcPts val="0"/>
+              </a:spcAft>
+              <a:buClrTx/>
+              <a:buSzTx/>
+              <a:buFont typeface="Arial" panose="020B0604020202020204" pitchFamily="34" charset="0"/>
+              <a:buNone/>
+              <a:tabLst/>
+              <a:defRPr lang="en-US" sz="2000" b="1" kern="1200" cap="all" baseline="0" dirty="0" smtClean="0">
+                <a:solidFill>
+                  <a:srgbClr val="DF411C"/>
+                </a:solidFill>
+                <a:latin typeface="+mj-lt"/>
+                <a:ea typeface="Arial" charset="0"/>
+                <a:cs typeface="Arial" charset="0"/>
+              </a:defRPr>
+            </a:lvl1pPr>
+            <a:lvl2pPr marL="0" indent="0" algn="l" defTabSz="914400" rtl="0" eaLnBrk="1" latinLnBrk="0" hangingPunct="1">
+              <a:lnSpc>
+                <a:spcPct val="90000"/>
+              </a:lnSpc>
+              <a:spcBef>
+                <a:spcPts val="500"/>
+              </a:spcBef>
+              <a:buFont typeface="Arial" panose="020B0604020202020204" pitchFamily="34" charset="0"/>
+              <a:buNone/>
+              <a:defRPr sz="1600" kern="1200">
+                <a:solidFill>
+                  <a:srgbClr val="4A4E52"/>
+                </a:solidFill>
+                <a:latin typeface="+mn-lt"/>
+                <a:ea typeface="+mn-ea"/>
+                <a:cs typeface="+mn-cs"/>
+              </a:defRPr>
+            </a:lvl2pPr>
+            <a:lvl3pPr marL="1257300" indent="-342900" algn="l" defTabSz="914400" rtl="0" eaLnBrk="1" latinLnBrk="0" hangingPunct="1">
+              <a:lnSpc>
+                <a:spcPct val="90000"/>
+              </a:lnSpc>
+              <a:spcBef>
+                <a:spcPts val="500"/>
+              </a:spcBef>
+              <a:buClr>
+                <a:srgbClr val="81ADB5"/>
+              </a:buClr>
+              <a:buFont typeface="Arial" panose="020B0604020202020204" pitchFamily="34" charset="0"/>
+              <a:buChar char="•"/>
+              <a:defRPr sz="1600" kern="1200">
+                <a:solidFill>
+                  <a:srgbClr val="4A4E52"/>
+                </a:solidFill>
+                <a:latin typeface="+mn-lt"/>
+                <a:ea typeface="+mn-ea"/>
+                <a:cs typeface="+mn-cs"/>
+              </a:defRPr>
+            </a:lvl3pPr>
+            <a:lvl4pPr marL="1600200" indent="-228600" algn="l" defTabSz="914400" rtl="0" eaLnBrk="1" latinLnBrk="0" hangingPunct="1">
+              <a:lnSpc>
+                <a:spcPct val="90000"/>
+              </a:lnSpc>
+              <a:spcBef>
+                <a:spcPts val="500"/>
+              </a:spcBef>
+              <a:buFont typeface="Calibri" panose="020F0502020204030204" pitchFamily="34" charset="0"/>
+              <a:buChar char="-"/>
+              <a:defRPr sz="1500" kern="1200">
+                <a:solidFill>
+                  <a:srgbClr val="4A4E52"/>
+                </a:solidFill>
+                <a:latin typeface="+mn-lt"/>
+                <a:ea typeface="+mn-ea"/>
+                <a:cs typeface="+mn-cs"/>
+              </a:defRPr>
+            </a:lvl4pPr>
+            <a:lvl5pPr marL="2057400" indent="-228600" algn="l" defTabSz="914400" rtl="0" eaLnBrk="1" latinLnBrk="0" hangingPunct="1">
+              <a:lnSpc>
+                <a:spcPct val="90000"/>
+              </a:lnSpc>
+              <a:spcBef>
+                <a:spcPts val="500"/>
+              </a:spcBef>
+              <a:buFont typeface="Arial" panose="020B0604020202020204" pitchFamily="34" charset="0"/>
+              <a:buChar char="•"/>
+              <a:defRPr sz="1800" kern="1200">
+                <a:solidFill>
+                  <a:srgbClr val="4A4E52"/>
+                </a:solidFill>
+                <a:latin typeface="+mn-lt"/>
+                <a:ea typeface="+mn-ea"/>
+                <a:cs typeface="+mn-cs"/>
+              </a:defRPr>
+            </a:lvl5pPr>
+            <a:lvl6pPr marL="2514600" indent="-228600" algn="l" defTabSz="914400" rtl="0" eaLnBrk="1" latinLnBrk="0" hangingPunct="1">
+              <a:lnSpc>
+                <a:spcPct val="90000"/>
+              </a:lnSpc>
+              <a:spcBef>
+                <a:spcPts val="500"/>
+              </a:spcBef>
+              <a:buFont typeface="Arial" panose="020B0604020202020204" pitchFamily="34" charset="0"/>
+              <a:buChar char="•"/>
+              <a:defRPr sz="1800" kern="1200">
+                <a:solidFill>
+                  <a:schemeClr val="tx1"/>
+                </a:solidFill>
+                <a:latin typeface="+mn-lt"/>
+                <a:ea typeface="+mn-ea"/>
+                <a:cs typeface="+mn-cs"/>
+              </a:defRPr>
+            </a:lvl6pPr>
+            <a:lvl7pPr marL="2971800" indent="-228600" algn="l" defTabSz="914400" rtl="0" eaLnBrk="1" latinLnBrk="0" hangingPunct="1">
+              <a:lnSpc>
+                <a:spcPct val="90000"/>
+              </a:lnSpc>
+              <a:spcBef>
+                <a:spcPts val="500"/>
+              </a:spcBef>
+              <a:buFont typeface="Arial" panose="020B0604020202020204" pitchFamily="34" charset="0"/>
+              <a:buChar char="•"/>
+              <a:defRPr sz="1800" kern="1200">
+                <a:solidFill>
+                  <a:schemeClr val="tx1"/>
+                </a:solidFill>
+                <a:latin typeface="+mn-lt"/>
+                <a:ea typeface="+mn-ea"/>
+                <a:cs typeface="+mn-cs"/>
+              </a:defRPr>
+            </a:lvl7pPr>
+            <a:lvl8pPr marL="3429000" indent="-228600" algn="l" defTabSz="914400" rtl="0" eaLnBrk="1" latinLnBrk="0" hangingPunct="1">
+              <a:lnSpc>
+                <a:spcPct val="90000"/>
+              </a:lnSpc>
+              <a:spcBef>
+                <a:spcPts val="500"/>
+              </a:spcBef>
+              <a:buFont typeface="Arial" panose="020B0604020202020204" pitchFamily="34" charset="0"/>
+              <a:buChar char="•"/>
+              <a:defRPr sz="1800" kern="1200">
+                <a:solidFill>
+                  <a:schemeClr val="tx1"/>
+                </a:solidFill>
+                <a:latin typeface="+mn-lt"/>
+                <a:ea typeface="+mn-ea"/>
+                <a:cs typeface="+mn-cs"/>
+              </a:defRPr>
+            </a:lvl8pPr>
+            <a:lvl9pPr marL="3886200" indent="-228600" algn="l" defTabSz="914400" rtl="0" eaLnBrk="1" latinLnBrk="0" hangingPunct="1">
+              <a:lnSpc>
+                <a:spcPct val="90000"/>
+              </a:lnSpc>
+              <a:spcBef>
+                <a:spcPts val="500"/>
+              </a:spcBef>
+              <a:buFont typeface="Arial" panose="020B0604020202020204" pitchFamily="34" charset="0"/>
+              <a:buChar char="•"/>
+              <a:defRPr sz="1800" kern="1200">
+                <a:solidFill>
+                  <a:schemeClr val="tx1"/>
+                </a:solidFill>
+                <a:latin typeface="+mn-lt"/>
+                <a:ea typeface="+mn-ea"/>
+                <a:cs typeface="+mn-cs"/>
+              </a:defRPr>
+            </a:lvl9pPr>
+          </a:lstStyle>
+          <a:p>
+            <a:pPr algn="ctr"/>
+            <a:r>
+              <a:rPr lang="en-US" sz="2600" dirty="0" smtClean="0">
+                <a:solidFill>
+                  <a:schemeClr val="bg1"/>
+                </a:solidFill>
+              </a:rPr>
+              <a:t>text</a:t>
+            </a:r>
+            <a:endParaRPr lang="en-GB" sz="2600" dirty="0">
+              <a:solidFill>
+                <a:schemeClr val="bg1"/>
+              </a:solidFill>
+            </a:endParaRPr>
+          </a:p>
+        </p:txBody>
+      </p:sp>
+      <p:sp>
+        <p:nvSpPr>
+          <p:cNvPr id="22" name="Content Placeholder 7"/>
+          <p:cNvSpPr txBox="1">
+            <a:spLocks/>
+          </p:cNvSpPr>
+          <p:nvPr/>
+        </p:nvSpPr>
+        <p:spPr>
+          <a:xfrm>
+            <a:off x="8936553" y="4412151"/>
+            <a:ext cx="2277801" cy="448637"/>
+          </a:xfrm>
+          <a:prstGeom prst="rect">
+            <a:avLst/>
+          </a:prstGeom>
+        </p:spPr>
+        <p:txBody>
+          <a:bodyPr vert="horz" lIns="0" tIns="0" rIns="0" bIns="45720" rtlCol="0" anchor="b" anchorCtr="0">
+            <a:normAutofit/>
+          </a:bodyPr>
+          <a:lstStyle>
+            <a:lvl1pPr marL="0" marR="0" indent="0" algn="l" defTabSz="914400" rtl="0" eaLnBrk="1" fontAlgn="auto" latinLnBrk="0" hangingPunct="1">
+              <a:lnSpc>
+                <a:spcPct val="90000"/>
+              </a:lnSpc>
+              <a:spcBef>
+                <a:spcPts val="1000"/>
+              </a:spcBef>
+              <a:spcAft>
+                <a:spcPts val="0"/>
+              </a:spcAft>
+              <a:buClrTx/>
+              <a:buSzTx/>
+              <a:buFont typeface="Arial" panose="020B0604020202020204" pitchFamily="34" charset="0"/>
+              <a:buNone/>
+              <a:tabLst/>
+              <a:defRPr lang="en-US" sz="2000" b="1" kern="1200" cap="all" baseline="0" dirty="0" smtClean="0">
+                <a:solidFill>
+                  <a:srgbClr val="DF411C"/>
+                </a:solidFill>
+                <a:latin typeface="+mj-lt"/>
+                <a:ea typeface="Arial" charset="0"/>
+                <a:cs typeface="Arial" charset="0"/>
+              </a:defRPr>
+            </a:lvl1pPr>
+            <a:lvl2pPr marL="0" indent="0" algn="l" defTabSz="914400" rtl="0" eaLnBrk="1" latinLnBrk="0" hangingPunct="1">
+              <a:lnSpc>
+                <a:spcPct val="90000"/>
+              </a:lnSpc>
+              <a:spcBef>
+                <a:spcPts val="500"/>
+              </a:spcBef>
+              <a:buFont typeface="Arial" panose="020B0604020202020204" pitchFamily="34" charset="0"/>
+              <a:buNone/>
+              <a:defRPr sz="1600" kern="1200">
+                <a:solidFill>
+                  <a:srgbClr val="4A4E52"/>
+                </a:solidFill>
+                <a:latin typeface="+mn-lt"/>
+                <a:ea typeface="+mn-ea"/>
+                <a:cs typeface="+mn-cs"/>
+              </a:defRPr>
+            </a:lvl2pPr>
+            <a:lvl3pPr marL="1257300" indent="-342900" algn="l" defTabSz="914400" rtl="0" eaLnBrk="1" latinLnBrk="0" hangingPunct="1">
+              <a:lnSpc>
+                <a:spcPct val="90000"/>
+              </a:lnSpc>
+              <a:spcBef>
+                <a:spcPts val="500"/>
+              </a:spcBef>
+              <a:buClr>
+                <a:srgbClr val="81ADB5"/>
+              </a:buClr>
+              <a:buFont typeface="Arial" panose="020B0604020202020204" pitchFamily="34" charset="0"/>
+              <a:buChar char="•"/>
+              <a:defRPr sz="1600" kern="1200">
+                <a:solidFill>
+                  <a:srgbClr val="4A4E52"/>
+                </a:solidFill>
+                <a:latin typeface="+mn-lt"/>
+                <a:ea typeface="+mn-ea"/>
+                <a:cs typeface="+mn-cs"/>
+              </a:defRPr>
+            </a:lvl3pPr>
+            <a:lvl4pPr marL="1600200" indent="-228600" algn="l" defTabSz="914400" rtl="0" eaLnBrk="1" latinLnBrk="0" hangingPunct="1">
+              <a:lnSpc>
+                <a:spcPct val="90000"/>
+              </a:lnSpc>
+              <a:spcBef>
+                <a:spcPts val="500"/>
+              </a:spcBef>
+              <a:buFont typeface="Calibri" panose="020F0502020204030204" pitchFamily="34" charset="0"/>
+              <a:buChar char="-"/>
+              <a:defRPr sz="1500" kern="1200">
+                <a:solidFill>
+                  <a:srgbClr val="4A4E52"/>
+                </a:solidFill>
+                <a:latin typeface="+mn-lt"/>
+                <a:ea typeface="+mn-ea"/>
+                <a:cs typeface="+mn-cs"/>
+              </a:defRPr>
+            </a:lvl4pPr>
+            <a:lvl5pPr marL="2057400" indent="-228600" algn="l" defTabSz="914400" rtl="0" eaLnBrk="1" latinLnBrk="0" hangingPunct="1">
+              <a:lnSpc>
+                <a:spcPct val="90000"/>
+              </a:lnSpc>
+              <a:spcBef>
+                <a:spcPts val="500"/>
+              </a:spcBef>
+              <a:buFont typeface="Arial" panose="020B0604020202020204" pitchFamily="34" charset="0"/>
+              <a:buChar char="•"/>
+              <a:defRPr sz="1800" kern="1200">
+                <a:solidFill>
+                  <a:srgbClr val="4A4E52"/>
+                </a:solidFill>
+                <a:latin typeface="+mn-lt"/>
+                <a:ea typeface="+mn-ea"/>
+                <a:cs typeface="+mn-cs"/>
+              </a:defRPr>
+            </a:lvl5pPr>
+            <a:lvl6pPr marL="2514600" indent="-228600" algn="l" defTabSz="914400" rtl="0" eaLnBrk="1" latinLnBrk="0" hangingPunct="1">
+              <a:lnSpc>
+                <a:spcPct val="90000"/>
+              </a:lnSpc>
+              <a:spcBef>
+                <a:spcPts val="500"/>
+              </a:spcBef>
+              <a:buFont typeface="Arial" panose="020B0604020202020204" pitchFamily="34" charset="0"/>
+              <a:buChar char="•"/>
+              <a:defRPr sz="1800" kern="1200">
+                <a:solidFill>
+                  <a:schemeClr val="tx1"/>
+                </a:solidFill>
+                <a:latin typeface="+mn-lt"/>
+                <a:ea typeface="+mn-ea"/>
+                <a:cs typeface="+mn-cs"/>
+              </a:defRPr>
+            </a:lvl6pPr>
+            <a:lvl7pPr marL="2971800" indent="-228600" algn="l" defTabSz="914400" rtl="0" eaLnBrk="1" latinLnBrk="0" hangingPunct="1">
+              <a:lnSpc>
+                <a:spcPct val="90000"/>
+              </a:lnSpc>
+              <a:spcBef>
+                <a:spcPts val="500"/>
+              </a:spcBef>
+              <a:buFont typeface="Arial" panose="020B0604020202020204" pitchFamily="34" charset="0"/>
+              <a:buChar char="•"/>
+              <a:defRPr sz="1800" kern="1200">
+                <a:solidFill>
+                  <a:schemeClr val="tx1"/>
+                </a:solidFill>
+                <a:latin typeface="+mn-lt"/>
+                <a:ea typeface="+mn-ea"/>
+                <a:cs typeface="+mn-cs"/>
+              </a:defRPr>
+            </a:lvl7pPr>
+            <a:lvl8pPr marL="3429000" indent="-228600" algn="l" defTabSz="914400" rtl="0" eaLnBrk="1" latinLnBrk="0" hangingPunct="1">
+              <a:lnSpc>
+                <a:spcPct val="90000"/>
+              </a:lnSpc>
+              <a:spcBef>
+                <a:spcPts val="500"/>
+              </a:spcBef>
+              <a:buFont typeface="Arial" panose="020B0604020202020204" pitchFamily="34" charset="0"/>
+              <a:buChar char="•"/>
+              <a:defRPr sz="1800" kern="1200">
+                <a:solidFill>
+                  <a:schemeClr val="tx1"/>
+                </a:solidFill>
+                <a:latin typeface="+mn-lt"/>
+                <a:ea typeface="+mn-ea"/>
+                <a:cs typeface="+mn-cs"/>
+              </a:defRPr>
+            </a:lvl8pPr>
+            <a:lvl9pPr marL="3886200" indent="-228600" algn="l" defTabSz="914400" rtl="0" eaLnBrk="1" latinLnBrk="0" hangingPunct="1">
+              <a:lnSpc>
+                <a:spcPct val="90000"/>
+              </a:lnSpc>
+              <a:spcBef>
+                <a:spcPts val="500"/>
+              </a:spcBef>
+              <a:buFont typeface="Arial" panose="020B0604020202020204" pitchFamily="34" charset="0"/>
+              <a:buChar char="•"/>
+              <a:defRPr sz="1800" kern="1200">
+                <a:solidFill>
+                  <a:schemeClr val="tx1"/>
+                </a:solidFill>
+                <a:latin typeface="+mn-lt"/>
+                <a:ea typeface="+mn-ea"/>
+                <a:cs typeface="+mn-cs"/>
+              </a:defRPr>
+            </a:lvl9pPr>
+          </a:lstStyle>
+          <a:p>
+            <a:pPr algn="ctr"/>
+            <a:r>
+              <a:rPr lang="en-US" sz="2600" dirty="0" smtClean="0">
+                <a:solidFill>
+                  <a:schemeClr val="bg1"/>
+                </a:solidFill>
+              </a:rPr>
+              <a:t>text</a:t>
+            </a:r>
+            <a:endParaRPr lang="en-GB" sz="2600" dirty="0">
+              <a:solidFill>
+                <a:schemeClr val="bg1"/>
+              </a:solidFill>
+            </a:endParaRPr>
+          </a:p>
+        </p:txBody>
+      </p:sp>
+      <p:pic>
+        <p:nvPicPr>
+          <p:cNvPr id="4" name="Picture 3"/>
+          <p:cNvPicPr>
+            <a:picLocks noChangeAspect="1"/>
+          </p:cNvPicPr>
+          <p:nvPr/>
+        </p:nvPicPr>
+        <p:blipFill>
+          <a:blip r:embed="rId2">
+            <a:extLst>
+              <a:ext uri="{28A0092B-C50C-407E-A947-70E740481C1C}">
+                <a14:useLocalDpi xmlns:a14="http://schemas.microsoft.com/office/drawing/2010/main" val="0"/>
+              </a:ext>
+            </a:extLst>
+          </a:blip>
+          <a:stretch>
+            <a:fillRect/>
+          </a:stretch>
+        </p:blipFill>
+        <p:spPr>
+          <a:xfrm>
+            <a:off x="2156274" y="2130144"/>
+            <a:ext cx="7620660" cy="3543607"/>
+          </a:xfrm>
+          <a:prstGeom prst="rect">
+            <a:avLst/>
+          </a:prstGeom>
+        </p:spPr>
+      </p:pic>
+    </p:spTree>
+    <p:extLst>
+      <p:ext uri="{BB962C8B-B14F-4D97-AF65-F5344CB8AC3E}">
+        <p14:creationId xmlns:p14="http://schemas.microsoft.com/office/powerpoint/2010/main" val="2704178988"/>
+      </p:ext>
+    </p:extLst>
+  </p:cSld>
+  <p:clrMapOvr>
+    <a:masterClrMapping/>
+  </p:clrMapOvr>
+  <p:timing>
+    <p:tnLst>
+      <p:par>
+        <p:cTn id="1" dur="indefinite" restart="never" nodeType="tmRoot"/>
+      </p:par>
+    </p:tnLst>
+  </p:timing>
+</p:sld>
+</file>
+
+<file path=ppt/slides/slide13.xml><?xml version="1.0" encoding="utf-8"?>
+<p:sld xmlns:a="http://schemas.openxmlformats.org/drawingml/2006/main" xmlns:r="http://schemas.openxmlformats.org/officeDocument/2006/relationships" xmlns:p="http://schemas.openxmlformats.org/presentationml/2006/main">
+  <p:cSld>
+    <p:spTree>
+      <p:nvGrpSpPr>
+        <p:cNvPr id="1" name=""/>
+        <p:cNvGrpSpPr/>
+        <p:nvPr/>
+      </p:nvGrpSpPr>
+      <p:grpSpPr>
+        <a:xfrm>
+          <a:off x="0" y="0"/>
+          <a:ext cx="0" cy="0"/>
+          <a:chOff x="0" y="0"/>
+          <a:chExt cx="0" cy="0"/>
+        </a:xfrm>
+      </p:grpSpPr>
+      <p:sp>
+        <p:nvSpPr>
+          <p:cNvPr id="2" name="Title 1"/>
+          <p:cNvSpPr>
+            <a:spLocks noGrp="1"/>
+          </p:cNvSpPr>
+          <p:nvPr>
+            <p:ph type="title"/>
+          </p:nvPr>
+        </p:nvSpPr>
+        <p:spPr/>
+        <p:txBody>
+          <a:bodyPr/>
+          <a:lstStyle/>
+          <a:p>
+            <a:r>
+              <a:rPr lang="en-GB" dirty="0" smtClean="0"/>
+              <a:t>Java Script + es6</a:t>
+            </a:r>
+            <a:endParaRPr lang="en-GB" dirty="0"/>
+          </a:p>
+        </p:txBody>
+      </p:sp>
+      <p:sp>
+        <p:nvSpPr>
+          <p:cNvPr id="5" name="Content Placeholder 4"/>
+          <p:cNvSpPr>
+            <a:spLocks noGrp="1"/>
+          </p:cNvSpPr>
+          <p:nvPr>
+            <p:ph idx="20"/>
+          </p:nvPr>
+        </p:nvSpPr>
+        <p:spPr>
+          <a:xfrm>
+            <a:off x="829483" y="1585571"/>
+            <a:ext cx="10594675" cy="338554"/>
+          </a:xfrm>
+        </p:spPr>
+        <p:txBody>
+          <a:bodyPr/>
+          <a:lstStyle/>
+          <a:p>
+            <a:pPr algn="ctr"/>
+            <a:r>
+              <a:rPr lang="en-US" dirty="0" smtClean="0">
+                <a:solidFill>
+                  <a:srgbClr val="FF0000"/>
+                </a:solidFill>
+              </a:rPr>
+              <a:t>GENERATORS</a:t>
+            </a:r>
+            <a:endParaRPr lang="en-GB" dirty="0">
+              <a:solidFill>
+                <a:srgbClr val="FF0000"/>
+              </a:solidFill>
+            </a:endParaRPr>
+          </a:p>
+        </p:txBody>
+      </p:sp>
+      <p:sp>
+        <p:nvSpPr>
+          <p:cNvPr id="14" name="TextBox 13"/>
+          <p:cNvSpPr txBox="1"/>
+          <p:nvPr/>
+        </p:nvSpPr>
+        <p:spPr>
+          <a:xfrm>
+            <a:off x="4361358" y="5343494"/>
+            <a:ext cx="1113576" cy="407310"/>
+          </a:xfrm>
+          <a:prstGeom prst="rect">
+            <a:avLst/>
+          </a:prstGeom>
+          <a:noFill/>
+        </p:spPr>
+        <p:txBody>
+          <a:bodyPr wrap="square" rtlCol="0">
+            <a:spAutoFit/>
+          </a:bodyPr>
+          <a:lstStyle/>
+          <a:p>
+            <a:pPr algn="ctr"/>
+            <a:r>
+              <a:rPr lang="en-US" sz="2000" b="1" spc="-150" dirty="0" smtClean="0">
+                <a:solidFill>
+                  <a:schemeClr val="bg1"/>
+                </a:solidFill>
+                <a:latin typeface="Arial Narrow" charset="0"/>
+                <a:ea typeface="Arial Narrow" charset="0"/>
+                <a:cs typeface="Arial Narrow" charset="0"/>
+              </a:rPr>
+              <a:t>TEXT</a:t>
+            </a:r>
+            <a:endParaRPr lang="en-GB" sz="2000" b="1" spc="-150" dirty="0">
+              <a:solidFill>
+                <a:schemeClr val="bg1"/>
+              </a:solidFill>
+              <a:latin typeface="Arial Narrow" charset="0"/>
+              <a:ea typeface="Arial Narrow" charset="0"/>
+              <a:cs typeface="Arial Narrow" charset="0"/>
+            </a:endParaRPr>
+          </a:p>
+        </p:txBody>
+      </p:sp>
+      <p:sp>
+        <p:nvSpPr>
+          <p:cNvPr id="16" name="Content Placeholder 7"/>
+          <p:cNvSpPr txBox="1">
+            <a:spLocks/>
+          </p:cNvSpPr>
+          <p:nvPr/>
+        </p:nvSpPr>
+        <p:spPr>
+          <a:xfrm>
+            <a:off x="6381366" y="5225114"/>
+            <a:ext cx="2277801" cy="448637"/>
+          </a:xfrm>
+          <a:prstGeom prst="rect">
+            <a:avLst/>
+          </a:prstGeom>
+        </p:spPr>
+        <p:txBody>
+          <a:bodyPr vert="horz" lIns="0" tIns="0" rIns="0" bIns="45720" rtlCol="0" anchor="b" anchorCtr="0">
+            <a:normAutofit/>
+          </a:bodyPr>
+          <a:lstStyle>
+            <a:lvl1pPr marL="0" marR="0" indent="0" algn="l" defTabSz="914400" rtl="0" eaLnBrk="1" fontAlgn="auto" latinLnBrk="0" hangingPunct="1">
+              <a:lnSpc>
+                <a:spcPct val="90000"/>
+              </a:lnSpc>
+              <a:spcBef>
+                <a:spcPts val="1000"/>
+              </a:spcBef>
+              <a:spcAft>
+                <a:spcPts val="0"/>
+              </a:spcAft>
+              <a:buClrTx/>
+              <a:buSzTx/>
+              <a:buFont typeface="Arial" panose="020B0604020202020204" pitchFamily="34" charset="0"/>
+              <a:buNone/>
+              <a:tabLst/>
+              <a:defRPr lang="en-US" sz="2000" b="1" kern="1200" cap="all" baseline="0" dirty="0" smtClean="0">
+                <a:solidFill>
+                  <a:srgbClr val="DF411C"/>
+                </a:solidFill>
+                <a:latin typeface="+mj-lt"/>
+                <a:ea typeface="Arial" charset="0"/>
+                <a:cs typeface="Arial" charset="0"/>
+              </a:defRPr>
+            </a:lvl1pPr>
+            <a:lvl2pPr marL="0" indent="0" algn="l" defTabSz="914400" rtl="0" eaLnBrk="1" latinLnBrk="0" hangingPunct="1">
+              <a:lnSpc>
+                <a:spcPct val="90000"/>
+              </a:lnSpc>
+              <a:spcBef>
+                <a:spcPts val="500"/>
+              </a:spcBef>
+              <a:buFont typeface="Arial" panose="020B0604020202020204" pitchFamily="34" charset="0"/>
+              <a:buNone/>
+              <a:defRPr sz="1600" kern="1200">
+                <a:solidFill>
+                  <a:srgbClr val="4A4E52"/>
+                </a:solidFill>
+                <a:latin typeface="+mn-lt"/>
+                <a:ea typeface="+mn-ea"/>
+                <a:cs typeface="+mn-cs"/>
+              </a:defRPr>
+            </a:lvl2pPr>
+            <a:lvl3pPr marL="1257300" indent="-342900" algn="l" defTabSz="914400" rtl="0" eaLnBrk="1" latinLnBrk="0" hangingPunct="1">
+              <a:lnSpc>
+                <a:spcPct val="90000"/>
+              </a:lnSpc>
+              <a:spcBef>
+                <a:spcPts val="500"/>
+              </a:spcBef>
+              <a:buClr>
+                <a:srgbClr val="81ADB5"/>
+              </a:buClr>
+              <a:buFont typeface="Arial" panose="020B0604020202020204" pitchFamily="34" charset="0"/>
+              <a:buChar char="•"/>
+              <a:defRPr sz="1600" kern="1200">
+                <a:solidFill>
+                  <a:srgbClr val="4A4E52"/>
+                </a:solidFill>
+                <a:latin typeface="+mn-lt"/>
+                <a:ea typeface="+mn-ea"/>
+                <a:cs typeface="+mn-cs"/>
+              </a:defRPr>
+            </a:lvl3pPr>
+            <a:lvl4pPr marL="1600200" indent="-228600" algn="l" defTabSz="914400" rtl="0" eaLnBrk="1" latinLnBrk="0" hangingPunct="1">
+              <a:lnSpc>
+                <a:spcPct val="90000"/>
+              </a:lnSpc>
+              <a:spcBef>
+                <a:spcPts val="500"/>
+              </a:spcBef>
+              <a:buFont typeface="Calibri" panose="020F0502020204030204" pitchFamily="34" charset="0"/>
+              <a:buChar char="-"/>
+              <a:defRPr sz="1500" kern="1200">
+                <a:solidFill>
+                  <a:srgbClr val="4A4E52"/>
+                </a:solidFill>
+                <a:latin typeface="+mn-lt"/>
+                <a:ea typeface="+mn-ea"/>
+                <a:cs typeface="+mn-cs"/>
+              </a:defRPr>
+            </a:lvl4pPr>
+            <a:lvl5pPr marL="2057400" indent="-228600" algn="l" defTabSz="914400" rtl="0" eaLnBrk="1" latinLnBrk="0" hangingPunct="1">
+              <a:lnSpc>
+                <a:spcPct val="90000"/>
+              </a:lnSpc>
+              <a:spcBef>
+                <a:spcPts val="500"/>
+              </a:spcBef>
+              <a:buFont typeface="Arial" panose="020B0604020202020204" pitchFamily="34" charset="0"/>
+              <a:buChar char="•"/>
+              <a:defRPr sz="1800" kern="1200">
+                <a:solidFill>
+                  <a:srgbClr val="4A4E52"/>
+                </a:solidFill>
+                <a:latin typeface="+mn-lt"/>
+                <a:ea typeface="+mn-ea"/>
+                <a:cs typeface="+mn-cs"/>
+              </a:defRPr>
+            </a:lvl5pPr>
+            <a:lvl6pPr marL="2514600" indent="-228600" algn="l" defTabSz="914400" rtl="0" eaLnBrk="1" latinLnBrk="0" hangingPunct="1">
+              <a:lnSpc>
+                <a:spcPct val="90000"/>
+              </a:lnSpc>
+              <a:spcBef>
+                <a:spcPts val="500"/>
+              </a:spcBef>
+              <a:buFont typeface="Arial" panose="020B0604020202020204" pitchFamily="34" charset="0"/>
+              <a:buChar char="•"/>
+              <a:defRPr sz="1800" kern="1200">
+                <a:solidFill>
+                  <a:schemeClr val="tx1"/>
+                </a:solidFill>
+                <a:latin typeface="+mn-lt"/>
+                <a:ea typeface="+mn-ea"/>
+                <a:cs typeface="+mn-cs"/>
+              </a:defRPr>
+            </a:lvl6pPr>
+            <a:lvl7pPr marL="2971800" indent="-228600" algn="l" defTabSz="914400" rtl="0" eaLnBrk="1" latinLnBrk="0" hangingPunct="1">
+              <a:lnSpc>
+                <a:spcPct val="90000"/>
+              </a:lnSpc>
+              <a:spcBef>
+                <a:spcPts val="500"/>
+              </a:spcBef>
+              <a:buFont typeface="Arial" panose="020B0604020202020204" pitchFamily="34" charset="0"/>
+              <a:buChar char="•"/>
+              <a:defRPr sz="1800" kern="1200">
+                <a:solidFill>
+                  <a:schemeClr val="tx1"/>
+                </a:solidFill>
+                <a:latin typeface="+mn-lt"/>
+                <a:ea typeface="+mn-ea"/>
+                <a:cs typeface="+mn-cs"/>
+              </a:defRPr>
+            </a:lvl7pPr>
+            <a:lvl8pPr marL="3429000" indent="-228600" algn="l" defTabSz="914400" rtl="0" eaLnBrk="1" latinLnBrk="0" hangingPunct="1">
+              <a:lnSpc>
+                <a:spcPct val="90000"/>
+              </a:lnSpc>
+              <a:spcBef>
+                <a:spcPts val="500"/>
+              </a:spcBef>
+              <a:buFont typeface="Arial" panose="020B0604020202020204" pitchFamily="34" charset="0"/>
+              <a:buChar char="•"/>
+              <a:defRPr sz="1800" kern="1200">
+                <a:solidFill>
+                  <a:schemeClr val="tx1"/>
+                </a:solidFill>
+                <a:latin typeface="+mn-lt"/>
+                <a:ea typeface="+mn-ea"/>
+                <a:cs typeface="+mn-cs"/>
+              </a:defRPr>
+            </a:lvl8pPr>
+            <a:lvl9pPr marL="3886200" indent="-228600" algn="l" defTabSz="914400" rtl="0" eaLnBrk="1" latinLnBrk="0" hangingPunct="1">
+              <a:lnSpc>
+                <a:spcPct val="90000"/>
+              </a:lnSpc>
+              <a:spcBef>
+                <a:spcPts val="500"/>
+              </a:spcBef>
+              <a:buFont typeface="Arial" panose="020B0604020202020204" pitchFamily="34" charset="0"/>
+              <a:buChar char="•"/>
+              <a:defRPr sz="1800" kern="1200">
+                <a:solidFill>
+                  <a:schemeClr val="tx1"/>
+                </a:solidFill>
+                <a:latin typeface="+mn-lt"/>
+                <a:ea typeface="+mn-ea"/>
+                <a:cs typeface="+mn-cs"/>
+              </a:defRPr>
+            </a:lvl9pPr>
+          </a:lstStyle>
+          <a:p>
+            <a:pPr algn="ctr"/>
+            <a:r>
+              <a:rPr lang="en-US" sz="2600" dirty="0" smtClean="0">
+                <a:solidFill>
+                  <a:schemeClr val="bg1"/>
+                </a:solidFill>
+              </a:rPr>
+              <a:t>text</a:t>
+            </a:r>
+            <a:endParaRPr lang="en-GB" sz="2600" dirty="0">
+              <a:solidFill>
+                <a:schemeClr val="bg1"/>
+              </a:solidFill>
+            </a:endParaRPr>
+          </a:p>
+        </p:txBody>
+      </p:sp>
+      <p:sp>
+        <p:nvSpPr>
+          <p:cNvPr id="22" name="Content Placeholder 7"/>
+          <p:cNvSpPr txBox="1">
+            <a:spLocks/>
+          </p:cNvSpPr>
+          <p:nvPr/>
+        </p:nvSpPr>
+        <p:spPr>
+          <a:xfrm>
+            <a:off x="8936553" y="4412151"/>
+            <a:ext cx="2277801" cy="448637"/>
+          </a:xfrm>
+          <a:prstGeom prst="rect">
+            <a:avLst/>
+          </a:prstGeom>
+        </p:spPr>
+        <p:txBody>
+          <a:bodyPr vert="horz" lIns="0" tIns="0" rIns="0" bIns="45720" rtlCol="0" anchor="b" anchorCtr="0">
+            <a:normAutofit/>
+          </a:bodyPr>
+          <a:lstStyle>
+            <a:lvl1pPr marL="0" marR="0" indent="0" algn="l" defTabSz="914400" rtl="0" eaLnBrk="1" fontAlgn="auto" latinLnBrk="0" hangingPunct="1">
+              <a:lnSpc>
+                <a:spcPct val="90000"/>
+              </a:lnSpc>
+              <a:spcBef>
+                <a:spcPts val="1000"/>
+              </a:spcBef>
+              <a:spcAft>
+                <a:spcPts val="0"/>
+              </a:spcAft>
+              <a:buClrTx/>
+              <a:buSzTx/>
+              <a:buFont typeface="Arial" panose="020B0604020202020204" pitchFamily="34" charset="0"/>
+              <a:buNone/>
+              <a:tabLst/>
+              <a:defRPr lang="en-US" sz="2000" b="1" kern="1200" cap="all" baseline="0" dirty="0" smtClean="0">
+                <a:solidFill>
+                  <a:srgbClr val="DF411C"/>
+                </a:solidFill>
+                <a:latin typeface="+mj-lt"/>
+                <a:ea typeface="Arial" charset="0"/>
+                <a:cs typeface="Arial" charset="0"/>
+              </a:defRPr>
+            </a:lvl1pPr>
+            <a:lvl2pPr marL="0" indent="0" algn="l" defTabSz="914400" rtl="0" eaLnBrk="1" latinLnBrk="0" hangingPunct="1">
+              <a:lnSpc>
+                <a:spcPct val="90000"/>
+              </a:lnSpc>
+              <a:spcBef>
+                <a:spcPts val="500"/>
+              </a:spcBef>
+              <a:buFont typeface="Arial" panose="020B0604020202020204" pitchFamily="34" charset="0"/>
+              <a:buNone/>
+              <a:defRPr sz="1600" kern="1200">
+                <a:solidFill>
+                  <a:srgbClr val="4A4E52"/>
+                </a:solidFill>
+                <a:latin typeface="+mn-lt"/>
+                <a:ea typeface="+mn-ea"/>
+                <a:cs typeface="+mn-cs"/>
+              </a:defRPr>
+            </a:lvl2pPr>
+            <a:lvl3pPr marL="1257300" indent="-342900" algn="l" defTabSz="914400" rtl="0" eaLnBrk="1" latinLnBrk="0" hangingPunct="1">
+              <a:lnSpc>
+                <a:spcPct val="90000"/>
+              </a:lnSpc>
+              <a:spcBef>
+                <a:spcPts val="500"/>
+              </a:spcBef>
+              <a:buClr>
+                <a:srgbClr val="81ADB5"/>
+              </a:buClr>
+              <a:buFont typeface="Arial" panose="020B0604020202020204" pitchFamily="34" charset="0"/>
+              <a:buChar char="•"/>
+              <a:defRPr sz="1600" kern="1200">
+                <a:solidFill>
+                  <a:srgbClr val="4A4E52"/>
+                </a:solidFill>
+                <a:latin typeface="+mn-lt"/>
+                <a:ea typeface="+mn-ea"/>
+                <a:cs typeface="+mn-cs"/>
+              </a:defRPr>
+            </a:lvl3pPr>
+            <a:lvl4pPr marL="1600200" indent="-228600" algn="l" defTabSz="914400" rtl="0" eaLnBrk="1" latinLnBrk="0" hangingPunct="1">
+              <a:lnSpc>
+                <a:spcPct val="90000"/>
+              </a:lnSpc>
+              <a:spcBef>
+                <a:spcPts val="500"/>
+              </a:spcBef>
+              <a:buFont typeface="Calibri" panose="020F0502020204030204" pitchFamily="34" charset="0"/>
+              <a:buChar char="-"/>
+              <a:defRPr sz="1500" kern="1200">
+                <a:solidFill>
+                  <a:srgbClr val="4A4E52"/>
+                </a:solidFill>
+                <a:latin typeface="+mn-lt"/>
+                <a:ea typeface="+mn-ea"/>
+                <a:cs typeface="+mn-cs"/>
+              </a:defRPr>
+            </a:lvl4pPr>
+            <a:lvl5pPr marL="2057400" indent="-228600" algn="l" defTabSz="914400" rtl="0" eaLnBrk="1" latinLnBrk="0" hangingPunct="1">
+              <a:lnSpc>
+                <a:spcPct val="90000"/>
+              </a:lnSpc>
+              <a:spcBef>
+                <a:spcPts val="500"/>
+              </a:spcBef>
+              <a:buFont typeface="Arial" panose="020B0604020202020204" pitchFamily="34" charset="0"/>
+              <a:buChar char="•"/>
+              <a:defRPr sz="1800" kern="1200">
+                <a:solidFill>
+                  <a:srgbClr val="4A4E52"/>
+                </a:solidFill>
+                <a:latin typeface="+mn-lt"/>
+                <a:ea typeface="+mn-ea"/>
+                <a:cs typeface="+mn-cs"/>
+              </a:defRPr>
+            </a:lvl5pPr>
+            <a:lvl6pPr marL="2514600" indent="-228600" algn="l" defTabSz="914400" rtl="0" eaLnBrk="1" latinLnBrk="0" hangingPunct="1">
+              <a:lnSpc>
+                <a:spcPct val="90000"/>
+              </a:lnSpc>
+              <a:spcBef>
+                <a:spcPts val="500"/>
+              </a:spcBef>
+              <a:buFont typeface="Arial" panose="020B0604020202020204" pitchFamily="34" charset="0"/>
+              <a:buChar char="•"/>
+              <a:defRPr sz="1800" kern="1200">
+                <a:solidFill>
+                  <a:schemeClr val="tx1"/>
+                </a:solidFill>
+                <a:latin typeface="+mn-lt"/>
+                <a:ea typeface="+mn-ea"/>
+                <a:cs typeface="+mn-cs"/>
+              </a:defRPr>
+            </a:lvl6pPr>
+            <a:lvl7pPr marL="2971800" indent="-228600" algn="l" defTabSz="914400" rtl="0" eaLnBrk="1" latinLnBrk="0" hangingPunct="1">
+              <a:lnSpc>
+                <a:spcPct val="90000"/>
+              </a:lnSpc>
+              <a:spcBef>
+                <a:spcPts val="500"/>
+              </a:spcBef>
+              <a:buFont typeface="Arial" panose="020B0604020202020204" pitchFamily="34" charset="0"/>
+              <a:buChar char="•"/>
+              <a:defRPr sz="1800" kern="1200">
+                <a:solidFill>
+                  <a:schemeClr val="tx1"/>
+                </a:solidFill>
+                <a:latin typeface="+mn-lt"/>
+                <a:ea typeface="+mn-ea"/>
+                <a:cs typeface="+mn-cs"/>
+              </a:defRPr>
+            </a:lvl7pPr>
+            <a:lvl8pPr marL="3429000" indent="-228600" algn="l" defTabSz="914400" rtl="0" eaLnBrk="1" latinLnBrk="0" hangingPunct="1">
+              <a:lnSpc>
+                <a:spcPct val="90000"/>
+              </a:lnSpc>
+              <a:spcBef>
+                <a:spcPts val="500"/>
+              </a:spcBef>
+              <a:buFont typeface="Arial" panose="020B0604020202020204" pitchFamily="34" charset="0"/>
+              <a:buChar char="•"/>
+              <a:defRPr sz="1800" kern="1200">
+                <a:solidFill>
+                  <a:schemeClr val="tx1"/>
+                </a:solidFill>
+                <a:latin typeface="+mn-lt"/>
+                <a:ea typeface="+mn-ea"/>
+                <a:cs typeface="+mn-cs"/>
+              </a:defRPr>
+            </a:lvl8pPr>
+            <a:lvl9pPr marL="3886200" indent="-228600" algn="l" defTabSz="914400" rtl="0" eaLnBrk="1" latinLnBrk="0" hangingPunct="1">
+              <a:lnSpc>
+                <a:spcPct val="90000"/>
+              </a:lnSpc>
+              <a:spcBef>
+                <a:spcPts val="500"/>
+              </a:spcBef>
+              <a:buFont typeface="Arial" panose="020B0604020202020204" pitchFamily="34" charset="0"/>
+              <a:buChar char="•"/>
+              <a:defRPr sz="1800" kern="1200">
+                <a:solidFill>
+                  <a:schemeClr val="tx1"/>
+                </a:solidFill>
+                <a:latin typeface="+mn-lt"/>
+                <a:ea typeface="+mn-ea"/>
+                <a:cs typeface="+mn-cs"/>
+              </a:defRPr>
+            </a:lvl9pPr>
+          </a:lstStyle>
+          <a:p>
+            <a:pPr algn="ctr"/>
+            <a:r>
+              <a:rPr lang="en-US" sz="2600" dirty="0" smtClean="0">
+                <a:solidFill>
+                  <a:schemeClr val="bg1"/>
+                </a:solidFill>
+              </a:rPr>
+              <a:t>text</a:t>
+            </a:r>
+            <a:endParaRPr lang="en-GB" sz="2600" dirty="0">
+              <a:solidFill>
+                <a:schemeClr val="bg1"/>
+              </a:solidFill>
+            </a:endParaRPr>
+          </a:p>
+        </p:txBody>
+      </p:sp>
+      <p:pic>
+        <p:nvPicPr>
+          <p:cNvPr id="3" name="Picture 2"/>
+          <p:cNvPicPr>
+            <a:picLocks noChangeAspect="1"/>
+          </p:cNvPicPr>
+          <p:nvPr/>
+        </p:nvPicPr>
+        <p:blipFill>
+          <a:blip r:embed="rId2">
+            <a:extLst>
+              <a:ext uri="{28A0092B-C50C-407E-A947-70E740481C1C}">
+                <a14:useLocalDpi xmlns:a14="http://schemas.microsoft.com/office/drawing/2010/main" val="0"/>
+              </a:ext>
+            </a:extLst>
+          </a:blip>
+          <a:stretch>
+            <a:fillRect/>
+          </a:stretch>
+        </p:blipFill>
+        <p:spPr>
+          <a:xfrm>
+            <a:off x="5559799" y="2395195"/>
+            <a:ext cx="5730737" cy="3124471"/>
+          </a:xfrm>
+          <a:prstGeom prst="rect">
+            <a:avLst/>
+          </a:prstGeom>
+        </p:spPr>
+      </p:pic>
+      <p:sp>
+        <p:nvSpPr>
+          <p:cNvPr id="4" name="TextBox 3"/>
+          <p:cNvSpPr txBox="1"/>
+          <p:nvPr/>
+        </p:nvSpPr>
+        <p:spPr>
+          <a:xfrm>
+            <a:off x="1458954" y="2710906"/>
+            <a:ext cx="3459192" cy="1477328"/>
+          </a:xfrm>
+          <a:prstGeom prst="rect">
+            <a:avLst/>
+          </a:prstGeom>
+          <a:noFill/>
+        </p:spPr>
+        <p:txBody>
+          <a:bodyPr wrap="square" rtlCol="0">
+            <a:spAutoFit/>
+          </a:bodyPr>
+          <a:lstStyle/>
+          <a:p>
+            <a:r>
+              <a:rPr lang="en-US" dirty="0" smtClean="0"/>
+              <a:t>Suspended start =&gt; </a:t>
+            </a:r>
+          </a:p>
+          <a:p>
+            <a:pPr marL="285750" indent="-285750">
+              <a:buFont typeface="Symbol" panose="05050102010706020507" pitchFamily="18" charset="2"/>
+              <a:buChar char="Þ"/>
+            </a:pPr>
+            <a:r>
+              <a:rPr lang="en-US" dirty="0" smtClean="0"/>
+              <a:t>Executing =&gt; </a:t>
+            </a:r>
+          </a:p>
+          <a:p>
+            <a:pPr marL="285750" indent="-285750">
+              <a:buFont typeface="Symbol" panose="05050102010706020507" pitchFamily="18" charset="2"/>
+              <a:buChar char="Þ"/>
+            </a:pPr>
+            <a:r>
+              <a:rPr lang="en-US" dirty="0" smtClean="0"/>
+              <a:t>Suspended </a:t>
+            </a:r>
+            <a:r>
+              <a:rPr lang="en-US" dirty="0" smtClean="0">
+                <a:solidFill>
+                  <a:srgbClr val="FF0000"/>
+                </a:solidFill>
+              </a:rPr>
+              <a:t>yield </a:t>
+            </a:r>
+            <a:r>
+              <a:rPr lang="en-US" dirty="0" smtClean="0"/>
+              <a:t>=&gt;</a:t>
+            </a:r>
+          </a:p>
+          <a:p>
+            <a:pPr marL="285750" indent="-285750">
+              <a:buFont typeface="Symbol" panose="05050102010706020507" pitchFamily="18" charset="2"/>
+              <a:buChar char="Þ"/>
+            </a:pPr>
+            <a:r>
+              <a:rPr lang="en-US" dirty="0" smtClean="0"/>
+              <a:t>Executing =&gt;</a:t>
+            </a:r>
+          </a:p>
+          <a:p>
+            <a:pPr marL="285750" indent="-285750">
+              <a:buFont typeface="Symbol" panose="05050102010706020507" pitchFamily="18" charset="2"/>
+              <a:buChar char="Þ"/>
+            </a:pPr>
+            <a:r>
+              <a:rPr lang="en-US" dirty="0" smtClean="0"/>
+              <a:t>Completed.  (</a:t>
+            </a:r>
+            <a:r>
+              <a:rPr lang="en-US" dirty="0" err="1" smtClean="0"/>
+              <a:t>Iterator.next</a:t>
+            </a:r>
+            <a:r>
+              <a:rPr lang="en-US" dirty="0" smtClean="0"/>
+              <a:t>())</a:t>
+            </a:r>
+            <a:endParaRPr lang="en-US" dirty="0"/>
+          </a:p>
+        </p:txBody>
+      </p:sp>
+    </p:spTree>
+    <p:extLst>
+      <p:ext uri="{BB962C8B-B14F-4D97-AF65-F5344CB8AC3E}">
+        <p14:creationId xmlns:p14="http://schemas.microsoft.com/office/powerpoint/2010/main" val="3978471304"/>
+      </p:ext>
+    </p:extLst>
+  </p:cSld>
+  <p:clrMapOvr>
+    <a:masterClrMapping/>
+  </p:clrMapOvr>
+  <p:timing>
+    <p:tnLst>
+      <p:par>
+        <p:cTn id="1" dur="indefinite" restart="never" nodeType="tmRoot"/>
+      </p:par>
+    </p:tnLst>
+  </p:timing>
+</p:sld>
+</file>
+
+<file path=ppt/slides/slide14.xml><?xml version="1.0" encoding="utf-8"?>
+<p:sld xmlns:a="http://schemas.openxmlformats.org/drawingml/2006/main" xmlns:r="http://schemas.openxmlformats.org/officeDocument/2006/relationships" xmlns:p="http://schemas.openxmlformats.org/presentationml/2006/main">
+  <p:cSld>
+    <p:spTree>
+      <p:nvGrpSpPr>
+        <p:cNvPr id="1" name=""/>
+        <p:cNvGrpSpPr/>
+        <p:nvPr/>
+      </p:nvGrpSpPr>
+      <p:grpSpPr>
+        <a:xfrm>
+          <a:off x="0" y="0"/>
+          <a:ext cx="0" cy="0"/>
+          <a:chOff x="0" y="0"/>
+          <a:chExt cx="0" cy="0"/>
+        </a:xfrm>
+      </p:grpSpPr>
+      <p:sp>
+        <p:nvSpPr>
+          <p:cNvPr id="2" name="Title 1"/>
+          <p:cNvSpPr>
+            <a:spLocks noGrp="1"/>
+          </p:cNvSpPr>
+          <p:nvPr>
+            <p:ph type="title"/>
+          </p:nvPr>
+        </p:nvSpPr>
+        <p:spPr/>
+        <p:txBody>
+          <a:bodyPr/>
+          <a:lstStyle/>
+          <a:p>
+            <a:r>
+              <a:rPr lang="en-GB" dirty="0" smtClean="0"/>
+              <a:t>Java Script + es6</a:t>
+            </a:r>
+            <a:endParaRPr lang="en-GB" dirty="0"/>
+          </a:p>
+        </p:txBody>
+      </p:sp>
+      <p:sp>
+        <p:nvSpPr>
+          <p:cNvPr id="5" name="Content Placeholder 4"/>
+          <p:cNvSpPr>
+            <a:spLocks noGrp="1"/>
+          </p:cNvSpPr>
+          <p:nvPr>
+            <p:ph idx="20"/>
+          </p:nvPr>
+        </p:nvSpPr>
+        <p:spPr>
+          <a:xfrm>
+            <a:off x="829483" y="1585571"/>
+            <a:ext cx="10594675" cy="338554"/>
+          </a:xfrm>
+        </p:spPr>
+        <p:txBody>
+          <a:bodyPr/>
+          <a:lstStyle/>
+          <a:p>
+            <a:pPr algn="ctr"/>
+            <a:r>
+              <a:rPr lang="en-US" dirty="0" smtClean="0">
+                <a:solidFill>
+                  <a:srgbClr val="FF0000"/>
+                </a:solidFill>
+              </a:rPr>
+              <a:t>GENERATORS + PROMISE</a:t>
+            </a:r>
+            <a:endParaRPr lang="en-GB" dirty="0">
+              <a:solidFill>
+                <a:srgbClr val="FF0000"/>
+              </a:solidFill>
+            </a:endParaRPr>
+          </a:p>
+        </p:txBody>
+      </p:sp>
+      <p:sp>
+        <p:nvSpPr>
+          <p:cNvPr id="14" name="TextBox 13"/>
+          <p:cNvSpPr txBox="1"/>
+          <p:nvPr/>
+        </p:nvSpPr>
+        <p:spPr>
+          <a:xfrm>
+            <a:off x="4361358" y="5343494"/>
+            <a:ext cx="1113576" cy="407310"/>
+          </a:xfrm>
+          <a:prstGeom prst="rect">
+            <a:avLst/>
+          </a:prstGeom>
+          <a:noFill/>
+        </p:spPr>
+        <p:txBody>
+          <a:bodyPr wrap="square" rtlCol="0">
+            <a:spAutoFit/>
+          </a:bodyPr>
+          <a:lstStyle/>
+          <a:p>
+            <a:pPr algn="ctr"/>
+            <a:r>
+              <a:rPr lang="en-US" sz="2000" b="1" spc="-150" dirty="0" smtClean="0">
+                <a:solidFill>
+                  <a:schemeClr val="bg1"/>
+                </a:solidFill>
+                <a:latin typeface="Arial Narrow" charset="0"/>
+                <a:ea typeface="Arial Narrow" charset="0"/>
+                <a:cs typeface="Arial Narrow" charset="0"/>
+              </a:rPr>
+              <a:t>TEXT</a:t>
+            </a:r>
+            <a:endParaRPr lang="en-GB" sz="2000" b="1" spc="-150" dirty="0">
+              <a:solidFill>
+                <a:schemeClr val="bg1"/>
+              </a:solidFill>
+              <a:latin typeface="Arial Narrow" charset="0"/>
+              <a:ea typeface="Arial Narrow" charset="0"/>
+              <a:cs typeface="Arial Narrow" charset="0"/>
+            </a:endParaRPr>
+          </a:p>
+        </p:txBody>
+      </p:sp>
+      <p:sp>
+        <p:nvSpPr>
+          <p:cNvPr id="16" name="Content Placeholder 7"/>
+          <p:cNvSpPr txBox="1">
+            <a:spLocks/>
+          </p:cNvSpPr>
+          <p:nvPr/>
+        </p:nvSpPr>
+        <p:spPr>
+          <a:xfrm>
+            <a:off x="6381366" y="5225114"/>
+            <a:ext cx="2277801" cy="448637"/>
+          </a:xfrm>
+          <a:prstGeom prst="rect">
+            <a:avLst/>
+          </a:prstGeom>
+        </p:spPr>
+        <p:txBody>
+          <a:bodyPr vert="horz" lIns="0" tIns="0" rIns="0" bIns="45720" rtlCol="0" anchor="b" anchorCtr="0">
+            <a:normAutofit/>
+          </a:bodyPr>
+          <a:lstStyle>
+            <a:lvl1pPr marL="0" marR="0" indent="0" algn="l" defTabSz="914400" rtl="0" eaLnBrk="1" fontAlgn="auto" latinLnBrk="0" hangingPunct="1">
+              <a:lnSpc>
+                <a:spcPct val="90000"/>
+              </a:lnSpc>
+              <a:spcBef>
+                <a:spcPts val="1000"/>
+              </a:spcBef>
+              <a:spcAft>
+                <a:spcPts val="0"/>
+              </a:spcAft>
+              <a:buClrTx/>
+              <a:buSzTx/>
+              <a:buFont typeface="Arial" panose="020B0604020202020204" pitchFamily="34" charset="0"/>
+              <a:buNone/>
+              <a:tabLst/>
+              <a:defRPr lang="en-US" sz="2000" b="1" kern="1200" cap="all" baseline="0" dirty="0" smtClean="0">
+                <a:solidFill>
+                  <a:srgbClr val="DF411C"/>
+                </a:solidFill>
+                <a:latin typeface="+mj-lt"/>
+                <a:ea typeface="Arial" charset="0"/>
+                <a:cs typeface="Arial" charset="0"/>
+              </a:defRPr>
+            </a:lvl1pPr>
+            <a:lvl2pPr marL="0" indent="0" algn="l" defTabSz="914400" rtl="0" eaLnBrk="1" latinLnBrk="0" hangingPunct="1">
+              <a:lnSpc>
+                <a:spcPct val="90000"/>
+              </a:lnSpc>
+              <a:spcBef>
+                <a:spcPts val="500"/>
+              </a:spcBef>
+              <a:buFont typeface="Arial" panose="020B0604020202020204" pitchFamily="34" charset="0"/>
+              <a:buNone/>
+              <a:defRPr sz="1600" kern="1200">
+                <a:solidFill>
+                  <a:srgbClr val="4A4E52"/>
+                </a:solidFill>
+                <a:latin typeface="+mn-lt"/>
+                <a:ea typeface="+mn-ea"/>
+                <a:cs typeface="+mn-cs"/>
+              </a:defRPr>
+            </a:lvl2pPr>
+            <a:lvl3pPr marL="1257300" indent="-342900" algn="l" defTabSz="914400" rtl="0" eaLnBrk="1" latinLnBrk="0" hangingPunct="1">
+              <a:lnSpc>
+                <a:spcPct val="90000"/>
+              </a:lnSpc>
+              <a:spcBef>
+                <a:spcPts val="500"/>
+              </a:spcBef>
+              <a:buClr>
+                <a:srgbClr val="81ADB5"/>
+              </a:buClr>
+              <a:buFont typeface="Arial" panose="020B0604020202020204" pitchFamily="34" charset="0"/>
+              <a:buChar char="•"/>
+              <a:defRPr sz="1600" kern="1200">
+                <a:solidFill>
+                  <a:srgbClr val="4A4E52"/>
+                </a:solidFill>
+                <a:latin typeface="+mn-lt"/>
+                <a:ea typeface="+mn-ea"/>
+                <a:cs typeface="+mn-cs"/>
+              </a:defRPr>
+            </a:lvl3pPr>
+            <a:lvl4pPr marL="1600200" indent="-228600" algn="l" defTabSz="914400" rtl="0" eaLnBrk="1" latinLnBrk="0" hangingPunct="1">
+              <a:lnSpc>
+                <a:spcPct val="90000"/>
+              </a:lnSpc>
+              <a:spcBef>
+                <a:spcPts val="500"/>
+              </a:spcBef>
+              <a:buFont typeface="Calibri" panose="020F0502020204030204" pitchFamily="34" charset="0"/>
+              <a:buChar char="-"/>
+              <a:defRPr sz="1500" kern="1200">
+                <a:solidFill>
+                  <a:srgbClr val="4A4E52"/>
+                </a:solidFill>
+                <a:latin typeface="+mn-lt"/>
+                <a:ea typeface="+mn-ea"/>
+                <a:cs typeface="+mn-cs"/>
+              </a:defRPr>
+            </a:lvl4pPr>
+            <a:lvl5pPr marL="2057400" indent="-228600" algn="l" defTabSz="914400" rtl="0" eaLnBrk="1" latinLnBrk="0" hangingPunct="1">
+              <a:lnSpc>
+                <a:spcPct val="90000"/>
+              </a:lnSpc>
+              <a:spcBef>
+                <a:spcPts val="500"/>
+              </a:spcBef>
+              <a:buFont typeface="Arial" panose="020B0604020202020204" pitchFamily="34" charset="0"/>
+              <a:buChar char="•"/>
+              <a:defRPr sz="1800" kern="1200">
+                <a:solidFill>
+                  <a:srgbClr val="4A4E52"/>
+                </a:solidFill>
+                <a:latin typeface="+mn-lt"/>
+                <a:ea typeface="+mn-ea"/>
+                <a:cs typeface="+mn-cs"/>
+              </a:defRPr>
+            </a:lvl5pPr>
+            <a:lvl6pPr marL="2514600" indent="-228600" algn="l" defTabSz="914400" rtl="0" eaLnBrk="1" latinLnBrk="0" hangingPunct="1">
+              <a:lnSpc>
+                <a:spcPct val="90000"/>
+              </a:lnSpc>
+              <a:spcBef>
+                <a:spcPts val="500"/>
+              </a:spcBef>
+              <a:buFont typeface="Arial" panose="020B0604020202020204" pitchFamily="34" charset="0"/>
+              <a:buChar char="•"/>
+              <a:defRPr sz="1800" kern="1200">
+                <a:solidFill>
+                  <a:schemeClr val="tx1"/>
+                </a:solidFill>
+                <a:latin typeface="+mn-lt"/>
+                <a:ea typeface="+mn-ea"/>
+                <a:cs typeface="+mn-cs"/>
+              </a:defRPr>
+            </a:lvl6pPr>
+            <a:lvl7pPr marL="2971800" indent="-228600" algn="l" defTabSz="914400" rtl="0" eaLnBrk="1" latinLnBrk="0" hangingPunct="1">
+              <a:lnSpc>
+                <a:spcPct val="90000"/>
+              </a:lnSpc>
+              <a:spcBef>
+                <a:spcPts val="500"/>
+              </a:spcBef>
+              <a:buFont typeface="Arial" panose="020B0604020202020204" pitchFamily="34" charset="0"/>
+              <a:buChar char="•"/>
+              <a:defRPr sz="1800" kern="1200">
+                <a:solidFill>
+                  <a:schemeClr val="tx1"/>
+                </a:solidFill>
+                <a:latin typeface="+mn-lt"/>
+                <a:ea typeface="+mn-ea"/>
+                <a:cs typeface="+mn-cs"/>
+              </a:defRPr>
+            </a:lvl7pPr>
+            <a:lvl8pPr marL="3429000" indent="-228600" algn="l" defTabSz="914400" rtl="0" eaLnBrk="1" latinLnBrk="0" hangingPunct="1">
+              <a:lnSpc>
+                <a:spcPct val="90000"/>
+              </a:lnSpc>
+              <a:spcBef>
+                <a:spcPts val="500"/>
+              </a:spcBef>
+              <a:buFont typeface="Arial" panose="020B0604020202020204" pitchFamily="34" charset="0"/>
+              <a:buChar char="•"/>
+              <a:defRPr sz="1800" kern="1200">
+                <a:solidFill>
+                  <a:schemeClr val="tx1"/>
+                </a:solidFill>
+                <a:latin typeface="+mn-lt"/>
+                <a:ea typeface="+mn-ea"/>
+                <a:cs typeface="+mn-cs"/>
+              </a:defRPr>
+            </a:lvl8pPr>
+            <a:lvl9pPr marL="3886200" indent="-228600" algn="l" defTabSz="914400" rtl="0" eaLnBrk="1" latinLnBrk="0" hangingPunct="1">
+              <a:lnSpc>
+                <a:spcPct val="90000"/>
+              </a:lnSpc>
+              <a:spcBef>
+                <a:spcPts val="500"/>
+              </a:spcBef>
+              <a:buFont typeface="Arial" panose="020B0604020202020204" pitchFamily="34" charset="0"/>
+              <a:buChar char="•"/>
+              <a:defRPr sz="1800" kern="1200">
+                <a:solidFill>
+                  <a:schemeClr val="tx1"/>
+                </a:solidFill>
+                <a:latin typeface="+mn-lt"/>
+                <a:ea typeface="+mn-ea"/>
+                <a:cs typeface="+mn-cs"/>
+              </a:defRPr>
+            </a:lvl9pPr>
+          </a:lstStyle>
+          <a:p>
+            <a:pPr algn="ctr"/>
+            <a:r>
+              <a:rPr lang="en-US" sz="2600" dirty="0" smtClean="0">
+                <a:solidFill>
+                  <a:schemeClr val="bg1"/>
+                </a:solidFill>
+              </a:rPr>
+              <a:t>text</a:t>
+            </a:r>
+            <a:endParaRPr lang="en-GB" sz="2600" dirty="0">
+              <a:solidFill>
+                <a:schemeClr val="bg1"/>
+              </a:solidFill>
+            </a:endParaRPr>
+          </a:p>
+        </p:txBody>
+      </p:sp>
+      <p:sp>
+        <p:nvSpPr>
+          <p:cNvPr id="22" name="Content Placeholder 7"/>
+          <p:cNvSpPr txBox="1">
+            <a:spLocks/>
+          </p:cNvSpPr>
+          <p:nvPr/>
+        </p:nvSpPr>
+        <p:spPr>
+          <a:xfrm>
+            <a:off x="8936553" y="4412151"/>
+            <a:ext cx="2277801" cy="448637"/>
+          </a:xfrm>
+          <a:prstGeom prst="rect">
+            <a:avLst/>
+          </a:prstGeom>
+        </p:spPr>
+        <p:txBody>
+          <a:bodyPr vert="horz" lIns="0" tIns="0" rIns="0" bIns="45720" rtlCol="0" anchor="b" anchorCtr="0">
+            <a:normAutofit/>
+          </a:bodyPr>
+          <a:lstStyle>
+            <a:lvl1pPr marL="0" marR="0" indent="0" algn="l" defTabSz="914400" rtl="0" eaLnBrk="1" fontAlgn="auto" latinLnBrk="0" hangingPunct="1">
+              <a:lnSpc>
+                <a:spcPct val="90000"/>
+              </a:lnSpc>
+              <a:spcBef>
+                <a:spcPts val="1000"/>
+              </a:spcBef>
+              <a:spcAft>
+                <a:spcPts val="0"/>
+              </a:spcAft>
+              <a:buClrTx/>
+              <a:buSzTx/>
+              <a:buFont typeface="Arial" panose="020B0604020202020204" pitchFamily="34" charset="0"/>
+              <a:buNone/>
+              <a:tabLst/>
+              <a:defRPr lang="en-US" sz="2000" b="1" kern="1200" cap="all" baseline="0" dirty="0" smtClean="0">
+                <a:solidFill>
+                  <a:srgbClr val="DF411C"/>
+                </a:solidFill>
+                <a:latin typeface="+mj-lt"/>
+                <a:ea typeface="Arial" charset="0"/>
+                <a:cs typeface="Arial" charset="0"/>
+              </a:defRPr>
+            </a:lvl1pPr>
+            <a:lvl2pPr marL="0" indent="0" algn="l" defTabSz="914400" rtl="0" eaLnBrk="1" latinLnBrk="0" hangingPunct="1">
+              <a:lnSpc>
+                <a:spcPct val="90000"/>
+              </a:lnSpc>
+              <a:spcBef>
+                <a:spcPts val="500"/>
+              </a:spcBef>
+              <a:buFont typeface="Arial" panose="020B0604020202020204" pitchFamily="34" charset="0"/>
+              <a:buNone/>
+              <a:defRPr sz="1600" kern="1200">
+                <a:solidFill>
+                  <a:srgbClr val="4A4E52"/>
+                </a:solidFill>
+                <a:latin typeface="+mn-lt"/>
+                <a:ea typeface="+mn-ea"/>
+                <a:cs typeface="+mn-cs"/>
+              </a:defRPr>
+            </a:lvl2pPr>
+            <a:lvl3pPr marL="1257300" indent="-342900" algn="l" defTabSz="914400" rtl="0" eaLnBrk="1" latinLnBrk="0" hangingPunct="1">
+              <a:lnSpc>
+                <a:spcPct val="90000"/>
+              </a:lnSpc>
+              <a:spcBef>
+                <a:spcPts val="500"/>
+              </a:spcBef>
+              <a:buClr>
+                <a:srgbClr val="81ADB5"/>
+              </a:buClr>
+              <a:buFont typeface="Arial" panose="020B0604020202020204" pitchFamily="34" charset="0"/>
+              <a:buChar char="•"/>
+              <a:defRPr sz="1600" kern="1200">
+                <a:solidFill>
+                  <a:srgbClr val="4A4E52"/>
+                </a:solidFill>
+                <a:latin typeface="+mn-lt"/>
+                <a:ea typeface="+mn-ea"/>
+                <a:cs typeface="+mn-cs"/>
+              </a:defRPr>
+            </a:lvl3pPr>
+            <a:lvl4pPr marL="1600200" indent="-228600" algn="l" defTabSz="914400" rtl="0" eaLnBrk="1" latinLnBrk="0" hangingPunct="1">
+              <a:lnSpc>
+                <a:spcPct val="90000"/>
+              </a:lnSpc>
+              <a:spcBef>
+                <a:spcPts val="500"/>
+              </a:spcBef>
+              <a:buFont typeface="Calibri" panose="020F0502020204030204" pitchFamily="34" charset="0"/>
+              <a:buChar char="-"/>
+              <a:defRPr sz="1500" kern="1200">
+                <a:solidFill>
+                  <a:srgbClr val="4A4E52"/>
+                </a:solidFill>
+                <a:latin typeface="+mn-lt"/>
+                <a:ea typeface="+mn-ea"/>
+                <a:cs typeface="+mn-cs"/>
+              </a:defRPr>
+            </a:lvl4pPr>
+            <a:lvl5pPr marL="2057400" indent="-228600" algn="l" defTabSz="914400" rtl="0" eaLnBrk="1" latinLnBrk="0" hangingPunct="1">
+              <a:lnSpc>
+                <a:spcPct val="90000"/>
+              </a:lnSpc>
+              <a:spcBef>
+                <a:spcPts val="500"/>
+              </a:spcBef>
+              <a:buFont typeface="Arial" panose="020B0604020202020204" pitchFamily="34" charset="0"/>
+              <a:buChar char="•"/>
+              <a:defRPr sz="1800" kern="1200">
+                <a:solidFill>
+                  <a:srgbClr val="4A4E52"/>
+                </a:solidFill>
+                <a:latin typeface="+mn-lt"/>
+                <a:ea typeface="+mn-ea"/>
+                <a:cs typeface="+mn-cs"/>
+              </a:defRPr>
+            </a:lvl5pPr>
+            <a:lvl6pPr marL="2514600" indent="-228600" algn="l" defTabSz="914400" rtl="0" eaLnBrk="1" latinLnBrk="0" hangingPunct="1">
+              <a:lnSpc>
+                <a:spcPct val="90000"/>
+              </a:lnSpc>
+              <a:spcBef>
+                <a:spcPts val="500"/>
+              </a:spcBef>
+              <a:buFont typeface="Arial" panose="020B0604020202020204" pitchFamily="34" charset="0"/>
+              <a:buChar char="•"/>
+              <a:defRPr sz="1800" kern="1200">
+                <a:solidFill>
+                  <a:schemeClr val="tx1"/>
+                </a:solidFill>
+                <a:latin typeface="+mn-lt"/>
+                <a:ea typeface="+mn-ea"/>
+                <a:cs typeface="+mn-cs"/>
+              </a:defRPr>
+            </a:lvl6pPr>
+            <a:lvl7pPr marL="2971800" indent="-228600" algn="l" defTabSz="914400" rtl="0" eaLnBrk="1" latinLnBrk="0" hangingPunct="1">
+              <a:lnSpc>
+                <a:spcPct val="90000"/>
+              </a:lnSpc>
+              <a:spcBef>
+                <a:spcPts val="500"/>
+              </a:spcBef>
+              <a:buFont typeface="Arial" panose="020B0604020202020204" pitchFamily="34" charset="0"/>
+              <a:buChar char="•"/>
+              <a:defRPr sz="1800" kern="1200">
+                <a:solidFill>
+                  <a:schemeClr val="tx1"/>
+                </a:solidFill>
+                <a:latin typeface="+mn-lt"/>
+                <a:ea typeface="+mn-ea"/>
+                <a:cs typeface="+mn-cs"/>
+              </a:defRPr>
+            </a:lvl7pPr>
+            <a:lvl8pPr marL="3429000" indent="-228600" algn="l" defTabSz="914400" rtl="0" eaLnBrk="1" latinLnBrk="0" hangingPunct="1">
+              <a:lnSpc>
+                <a:spcPct val="90000"/>
+              </a:lnSpc>
+              <a:spcBef>
+                <a:spcPts val="500"/>
+              </a:spcBef>
+              <a:buFont typeface="Arial" panose="020B0604020202020204" pitchFamily="34" charset="0"/>
+              <a:buChar char="•"/>
+              <a:defRPr sz="1800" kern="1200">
+                <a:solidFill>
+                  <a:schemeClr val="tx1"/>
+                </a:solidFill>
+                <a:latin typeface="+mn-lt"/>
+                <a:ea typeface="+mn-ea"/>
+                <a:cs typeface="+mn-cs"/>
+              </a:defRPr>
+            </a:lvl8pPr>
+            <a:lvl9pPr marL="3886200" indent="-228600" algn="l" defTabSz="914400" rtl="0" eaLnBrk="1" latinLnBrk="0" hangingPunct="1">
+              <a:lnSpc>
+                <a:spcPct val="90000"/>
+              </a:lnSpc>
+              <a:spcBef>
+                <a:spcPts val="500"/>
+              </a:spcBef>
+              <a:buFont typeface="Arial" panose="020B0604020202020204" pitchFamily="34" charset="0"/>
+              <a:buChar char="•"/>
+              <a:defRPr sz="1800" kern="1200">
+                <a:solidFill>
+                  <a:schemeClr val="tx1"/>
+                </a:solidFill>
+                <a:latin typeface="+mn-lt"/>
+                <a:ea typeface="+mn-ea"/>
+                <a:cs typeface="+mn-cs"/>
+              </a:defRPr>
+            </a:lvl9pPr>
+          </a:lstStyle>
+          <a:p>
+            <a:pPr algn="ctr"/>
+            <a:r>
+              <a:rPr lang="en-US" sz="2600" dirty="0" smtClean="0">
+                <a:solidFill>
+                  <a:schemeClr val="bg1"/>
+                </a:solidFill>
+              </a:rPr>
+              <a:t>text</a:t>
+            </a:r>
+            <a:endParaRPr lang="en-GB" sz="2600" dirty="0">
+              <a:solidFill>
+                <a:schemeClr val="bg1"/>
+              </a:solidFill>
+            </a:endParaRPr>
+          </a:p>
+        </p:txBody>
+      </p:sp>
+      <p:pic>
+        <p:nvPicPr>
+          <p:cNvPr id="4" name="Picture 3"/>
+          <p:cNvPicPr>
+            <a:picLocks noChangeAspect="1"/>
+          </p:cNvPicPr>
+          <p:nvPr/>
+        </p:nvPicPr>
+        <p:blipFill>
+          <a:blip r:embed="rId2">
+            <a:extLst>
+              <a:ext uri="{28A0092B-C50C-407E-A947-70E740481C1C}">
+                <a14:useLocalDpi xmlns:a14="http://schemas.microsoft.com/office/drawing/2010/main" val="0"/>
+              </a:ext>
+            </a:extLst>
+          </a:blip>
+          <a:stretch>
+            <a:fillRect/>
+          </a:stretch>
+        </p:blipFill>
+        <p:spPr>
+          <a:xfrm>
+            <a:off x="2363638" y="2020061"/>
+            <a:ext cx="6662062" cy="4558253"/>
+          </a:xfrm>
+          <a:prstGeom prst="rect">
+            <a:avLst/>
+          </a:prstGeom>
+        </p:spPr>
+      </p:pic>
+    </p:spTree>
+    <p:extLst>
+      <p:ext uri="{BB962C8B-B14F-4D97-AF65-F5344CB8AC3E}">
+        <p14:creationId xmlns:p14="http://schemas.microsoft.com/office/powerpoint/2010/main" val="1359322680"/>
+      </p:ext>
+    </p:extLst>
+  </p:cSld>
+  <p:clrMapOvr>
+    <a:masterClrMapping/>
+  </p:clrMapOvr>
+  <p:timing>
+    <p:tnLst>
+      <p:par>
+        <p:cTn id="1" dur="indefinite" restart="never" nodeType="tmRoot"/>
+      </p:par>
+    </p:tnLst>
+  </p:timing>
+</p:sld>
+</file>
+
+<file path=ppt/slides/slide15.xml><?xml version="1.0" encoding="utf-8"?>
 <p:sld xmlns:a="http://schemas.openxmlformats.org/drawingml/2006/main" xmlns:r="http://schemas.openxmlformats.org/officeDocument/2006/relationships" xmlns:p="http://schemas.openxmlformats.org/presentationml/2006/main">
   <p:cSld>
     <p:spTree>
@@ -13353,7 +15222,7 @@
 </p:sld>
 </file>
 
-<file path=ppt/slides/slide13.xml><?xml version="1.0" encoding="utf-8"?>
+<file path=ppt/slides/slide16.xml><?xml version="1.0" encoding="utf-8"?>
 <p:sld xmlns:a="http://schemas.openxmlformats.org/drawingml/2006/main" xmlns:r="http://schemas.openxmlformats.org/officeDocument/2006/relationships" xmlns:p="http://schemas.openxmlformats.org/presentationml/2006/main">
   <p:cSld>
     <p:spTree>
@@ -13469,7 +15338,7 @@
 </p:sld>
 </file>
 
-<file path=ppt/slides/slide14.xml><?xml version="1.0" encoding="utf-8"?>
+<file path=ppt/slides/slide17.xml><?xml version="1.0" encoding="utf-8"?>
 <p:sld xmlns:a="http://schemas.openxmlformats.org/drawingml/2006/main" xmlns:r="http://schemas.openxmlformats.org/officeDocument/2006/relationships" xmlns:p="http://schemas.openxmlformats.org/presentationml/2006/main">
   <p:cSld>
     <p:spTree>
@@ -13890,7 +15759,7 @@
 </p:sld>
 </file>
 
-<file path=ppt/slides/slide15.xml><?xml version="1.0" encoding="utf-8"?>
+<file path=ppt/slides/slide18.xml><?xml version="1.0" encoding="utf-8"?>
 <p:sld xmlns:a="http://schemas.openxmlformats.org/drawingml/2006/main" xmlns:r="http://schemas.openxmlformats.org/officeDocument/2006/relationships" xmlns:p="http://schemas.openxmlformats.org/presentationml/2006/main">
   <p:cSld>
     <p:spTree>
@@ -14018,7 +15887,7 @@
 </p:sld>
 </file>
 
-<file path=ppt/slides/slide16.xml><?xml version="1.0" encoding="utf-8"?>
+<file path=ppt/slides/slide19.xml><?xml version="1.0" encoding="utf-8"?>
 <p:sld xmlns:a="http://schemas.openxmlformats.org/drawingml/2006/main" xmlns:r="http://schemas.openxmlformats.org/officeDocument/2006/relationships" xmlns:p="http://schemas.openxmlformats.org/presentationml/2006/main">
   <p:cSld>
     <p:spTree>
@@ -14056,15 +15925,7 @@
                   <a:srgbClr val="FF0000"/>
                 </a:solidFill>
               </a:rPr>
-              <a:t> </a:t>
-            </a:r>
-            <a:r>
-              <a:rPr lang="en-US" dirty="0" smtClean="0">
-                <a:solidFill>
-                  <a:srgbClr val="FF0000"/>
-                </a:solidFill>
-              </a:rPr>
-              <a:t>Cucumber feature files</a:t>
+              <a:t> Cucumber feature files</a:t>
             </a:r>
             <a:endParaRPr lang="en-GB" dirty="0">
               <a:solidFill>
@@ -14154,475 +16015,6 @@
 </p:sld>
 </file>
 
-<file path=ppt/slides/slide17.xml><?xml version="1.0" encoding="utf-8"?>
-<p:sld xmlns:a="http://schemas.openxmlformats.org/drawingml/2006/main" xmlns:r="http://schemas.openxmlformats.org/officeDocument/2006/relationships" xmlns:p="http://schemas.openxmlformats.org/presentationml/2006/main">
-  <p:cSld>
-    <p:spTree>
-      <p:nvGrpSpPr>
-        <p:cNvPr id="1" name=""/>
-        <p:cNvGrpSpPr/>
-        <p:nvPr/>
-      </p:nvGrpSpPr>
-      <p:grpSpPr>
-        <a:xfrm>
-          <a:off x="0" y="0"/>
-          <a:ext cx="0" cy="0"/>
-          <a:chOff x="0" y="0"/>
-          <a:chExt cx="0" cy="0"/>
-        </a:xfrm>
-      </p:grpSpPr>
-      <p:sp>
-        <p:nvSpPr>
-          <p:cNvPr id="3" name="Title 2"/>
-          <p:cNvSpPr>
-            <a:spLocks noGrp="1"/>
-          </p:cNvSpPr>
-          <p:nvPr>
-            <p:ph type="title"/>
-          </p:nvPr>
-        </p:nvSpPr>
-        <p:spPr/>
-        <p:txBody>
-          <a:bodyPr/>
-          <a:lstStyle/>
-          <a:p>
-            <a:r>
-              <a:rPr lang="en-US" dirty="0" smtClean="0">
-                <a:solidFill>
-                  <a:srgbClr val="FF0000"/>
-                </a:solidFill>
-              </a:rPr>
-              <a:t>Example</a:t>
-            </a:r>
-            <a:endParaRPr lang="en-GB" dirty="0">
-              <a:solidFill>
-                <a:srgbClr val="FF0000"/>
-              </a:solidFill>
-            </a:endParaRPr>
-          </a:p>
-        </p:txBody>
-      </p:sp>
-      <p:sp>
-        <p:nvSpPr>
-          <p:cNvPr id="5" name="Content Placeholder 4"/>
-          <p:cNvSpPr>
-            <a:spLocks noGrp="1"/>
-          </p:cNvSpPr>
-          <p:nvPr>
-            <p:ph idx="13"/>
-          </p:nvPr>
-        </p:nvSpPr>
-        <p:spPr>
-          <a:xfrm>
-            <a:off x="806824" y="1958196"/>
-            <a:ext cx="10562792" cy="620683"/>
-          </a:xfrm>
-        </p:spPr>
-        <p:txBody>
-          <a:bodyPr/>
-          <a:lstStyle/>
-          <a:p>
-            <a:r>
-              <a:rPr lang="en-US" dirty="0" smtClean="0"/>
-              <a:t>Lets see the practical work in action….</a:t>
-            </a:r>
-            <a:endParaRPr lang="en-US" dirty="0" smtClean="0"/>
-          </a:p>
-          <a:p>
-            <a:endParaRPr lang="en-US" dirty="0"/>
-          </a:p>
-        </p:txBody>
-      </p:sp>
-    </p:spTree>
-    <p:extLst>
-      <p:ext uri="{BB962C8B-B14F-4D97-AF65-F5344CB8AC3E}">
-        <p14:creationId xmlns:p14="http://schemas.microsoft.com/office/powerpoint/2010/main" val="2848050199"/>
-      </p:ext>
-    </p:extLst>
-  </p:cSld>
-  <p:clrMapOvr>
-    <a:masterClrMapping/>
-  </p:clrMapOvr>
-  <p:timing>
-    <p:tnLst>
-      <p:par>
-        <p:cTn id="1" dur="indefinite" restart="never" nodeType="tmRoot"/>
-      </p:par>
-    </p:tnLst>
-  </p:timing>
-</p:sld>
-</file>
-
-<file path=ppt/slides/slide18.xml><?xml version="1.0" encoding="utf-8"?>
-<p:sld xmlns:a="http://schemas.openxmlformats.org/drawingml/2006/main" xmlns:r="http://schemas.openxmlformats.org/officeDocument/2006/relationships" xmlns:p="http://schemas.openxmlformats.org/presentationml/2006/main">
-  <p:cSld>
-    <p:spTree>
-      <p:nvGrpSpPr>
-        <p:cNvPr id="1" name=""/>
-        <p:cNvGrpSpPr/>
-        <p:nvPr/>
-      </p:nvGrpSpPr>
-      <p:grpSpPr>
-        <a:xfrm>
-          <a:off x="0" y="0"/>
-          <a:ext cx="0" cy="0"/>
-          <a:chOff x="0" y="0"/>
-          <a:chExt cx="0" cy="0"/>
-        </a:xfrm>
-      </p:grpSpPr>
-      <p:sp>
-        <p:nvSpPr>
-          <p:cNvPr id="3" name="Title 2"/>
-          <p:cNvSpPr>
-            <a:spLocks noGrp="1"/>
-          </p:cNvSpPr>
-          <p:nvPr>
-            <p:ph type="title"/>
-          </p:nvPr>
-        </p:nvSpPr>
-        <p:spPr/>
-        <p:txBody>
-          <a:bodyPr/>
-          <a:lstStyle/>
-          <a:p>
-            <a:r>
-              <a:rPr lang="en-US" dirty="0" smtClean="0">
-                <a:solidFill>
-                  <a:srgbClr val="FF0000"/>
-                </a:solidFill>
-              </a:rPr>
-              <a:t> Sources</a:t>
-            </a:r>
-            <a:endParaRPr lang="en-GB" dirty="0">
-              <a:solidFill>
-                <a:srgbClr val="FF0000"/>
-              </a:solidFill>
-            </a:endParaRPr>
-          </a:p>
-        </p:txBody>
-      </p:sp>
-      <p:sp>
-        <p:nvSpPr>
-          <p:cNvPr id="5" name="Content Placeholder 4"/>
-          <p:cNvSpPr>
-            <a:spLocks noGrp="1"/>
-          </p:cNvSpPr>
-          <p:nvPr>
-            <p:ph idx="13"/>
-          </p:nvPr>
-        </p:nvSpPr>
-        <p:spPr>
-          <a:xfrm>
-            <a:off x="845425" y="1595887"/>
-            <a:ext cx="10562792" cy="4124206"/>
-          </a:xfrm>
-        </p:spPr>
-        <p:txBody>
-          <a:bodyPr/>
-          <a:lstStyle/>
-          <a:p>
-            <a:r>
-              <a:rPr lang="en-US" b="1" dirty="0" smtClean="0"/>
-              <a:t>Protractor</a:t>
-            </a:r>
-            <a:r>
-              <a:rPr lang="en-US" sz="1200" b="1" dirty="0" smtClean="0"/>
-              <a:t>:</a:t>
-            </a:r>
-            <a:endParaRPr lang="en-US" sz="1200" b="1" dirty="0" smtClean="0"/>
-          </a:p>
-          <a:p>
-            <a:pPr marL="285750" indent="-285750">
-              <a:buFont typeface="Arial" panose="020B0604020202020204" pitchFamily="34" charset="0"/>
-              <a:buChar char="•"/>
-            </a:pPr>
-            <a:r>
-              <a:rPr lang="en-US" sz="1200" dirty="0">
-                <a:hlinkClick r:id="rId2"/>
-              </a:rPr>
-              <a:t>http://www.protractortest.org</a:t>
-            </a:r>
-            <a:r>
-              <a:rPr lang="en-US" sz="1200" dirty="0" smtClean="0">
-                <a:hlinkClick r:id="rId2"/>
-              </a:rPr>
-              <a:t>/#/</a:t>
-            </a:r>
-            <a:endParaRPr lang="en-US" sz="1200" dirty="0" smtClean="0"/>
-          </a:p>
-          <a:p>
-            <a:pPr marL="285750" indent="-285750">
-              <a:buFont typeface="Arial" panose="020B0604020202020204" pitchFamily="34" charset="0"/>
-              <a:buChar char="•"/>
-            </a:pPr>
-            <a:r>
-              <a:rPr lang="en-US" sz="1200" dirty="0">
-                <a:hlinkClick r:id="rId3"/>
-              </a:rPr>
-              <a:t>http://www.protractortest.org/#/</a:t>
-            </a:r>
-            <a:r>
-              <a:rPr lang="en-US" sz="1200" dirty="0" smtClean="0">
-                <a:hlinkClick r:id="rId3"/>
-              </a:rPr>
-              <a:t>api?view=webdriver.WebDriver.prototype.actions</a:t>
-            </a:r>
-            <a:endParaRPr lang="en-US" sz="1200" dirty="0" smtClean="0"/>
-          </a:p>
-          <a:p>
-            <a:pPr marL="285750" indent="-285750">
-              <a:buFont typeface="Arial" panose="020B0604020202020204" pitchFamily="34" charset="0"/>
-              <a:buChar char="•"/>
-            </a:pPr>
-            <a:r>
-              <a:rPr lang="en-US" sz="1200" dirty="0">
-                <a:hlinkClick r:id="rId4"/>
-              </a:rPr>
-              <a:t>https://</a:t>
-            </a:r>
-            <a:r>
-              <a:rPr lang="en-US" sz="1200" dirty="0" smtClean="0">
-                <a:hlinkClick r:id="rId4"/>
-              </a:rPr>
-              <a:t>www.thoughtworks.com/insights/blog/using-page-objects-overcome-protractors-shortcomings</a:t>
-            </a:r>
-            <a:endParaRPr lang="en-US" sz="1200" dirty="0" smtClean="0"/>
-          </a:p>
-          <a:p>
-            <a:endParaRPr lang="en-US" sz="1200" dirty="0" smtClean="0"/>
-          </a:p>
-          <a:p>
-            <a:pPr marL="285750" indent="-285750">
-              <a:buFont typeface="Arial" panose="020B0604020202020204" pitchFamily="34" charset="0"/>
-              <a:buChar char="•"/>
-            </a:pPr>
-            <a:endParaRPr lang="en-US" sz="1200" dirty="0" smtClean="0"/>
-          </a:p>
-          <a:p>
-            <a:r>
-              <a:rPr lang="en-US" sz="1200" b="1" dirty="0" smtClean="0"/>
-              <a:t>Java Script:</a:t>
-            </a:r>
-            <a:endParaRPr lang="en-US" sz="1200" b="1" dirty="0" smtClean="0"/>
-          </a:p>
-          <a:p>
-            <a:pPr marL="285750" indent="-285750">
-              <a:buFont typeface="Arial" panose="020B0604020202020204" pitchFamily="34" charset="0"/>
-              <a:buChar char="•"/>
-            </a:pPr>
-            <a:r>
-              <a:rPr lang="en-US" sz="1200" dirty="0">
-                <a:hlinkClick r:id="rId5"/>
-              </a:rPr>
-              <a:t>https://code.tutsplus.com/tutorials/how-to-use-map-filter-reduce-in-javascript--</a:t>
-            </a:r>
-            <a:r>
-              <a:rPr lang="en-US" sz="1200" dirty="0" smtClean="0">
-                <a:hlinkClick r:id="rId5"/>
-              </a:rPr>
-              <a:t>cms-26209</a:t>
-            </a:r>
-            <a:endParaRPr lang="en-US" sz="1200" b="1" dirty="0"/>
-          </a:p>
-          <a:p>
-            <a:r>
-              <a:rPr lang="en-US" sz="1200" b="1" dirty="0" err="1" smtClean="0"/>
-              <a:t>CucumberJS</a:t>
-            </a:r>
-            <a:r>
-              <a:rPr lang="en-US" sz="1200" b="1" dirty="0" smtClean="0"/>
-              <a:t> + Protractor</a:t>
-            </a:r>
-          </a:p>
-          <a:p>
-            <a:pPr marL="171450" indent="-171450">
-              <a:buFont typeface="Arial" panose="020B0604020202020204" pitchFamily="34" charset="0"/>
-              <a:buChar char="•"/>
-            </a:pPr>
-            <a:r>
-              <a:rPr lang="en-US" sz="1200" b="1" dirty="0">
-                <a:hlinkClick r:id="rId6"/>
-              </a:rPr>
-              <a:t>https://</a:t>
-            </a:r>
-            <a:r>
-              <a:rPr lang="en-US" sz="1200" b="1" dirty="0" smtClean="0">
-                <a:hlinkClick r:id="rId6"/>
-              </a:rPr>
-              <a:t>semaphoreci.com/community/tutorials/getting-started-with-protractor-and-cucumber</a:t>
-            </a:r>
-            <a:endParaRPr lang="en-US" sz="1200" b="1" dirty="0" smtClean="0"/>
-          </a:p>
-          <a:p>
-            <a:pPr marL="171450" indent="-171450">
-              <a:buFont typeface="Arial" panose="020B0604020202020204" pitchFamily="34" charset="0"/>
-              <a:buChar char="•"/>
-            </a:pPr>
-            <a:endParaRPr lang="en-US" sz="1200" b="1" dirty="0"/>
-          </a:p>
-          <a:p>
-            <a:endParaRPr lang="en-US" dirty="0" smtClean="0"/>
-          </a:p>
-          <a:p>
-            <a:endParaRPr lang="en-US" dirty="0"/>
-          </a:p>
-        </p:txBody>
-      </p:sp>
-    </p:spTree>
-    <p:extLst>
-      <p:ext uri="{BB962C8B-B14F-4D97-AF65-F5344CB8AC3E}">
-        <p14:creationId xmlns:p14="http://schemas.microsoft.com/office/powerpoint/2010/main" val="3004802942"/>
-      </p:ext>
-    </p:extLst>
-  </p:cSld>
-  <p:clrMapOvr>
-    <a:masterClrMapping/>
-  </p:clrMapOvr>
-  <p:timing>
-    <p:tnLst>
-      <p:par>
-        <p:cTn id="1" dur="indefinite" restart="never" nodeType="tmRoot"/>
-      </p:par>
-    </p:tnLst>
-  </p:timing>
-</p:sld>
-</file>
-
-<file path=ppt/slides/slide19.xml><?xml version="1.0" encoding="utf-8"?>
-<p:sld xmlns:a="http://schemas.openxmlformats.org/drawingml/2006/main" xmlns:r="http://schemas.openxmlformats.org/officeDocument/2006/relationships" xmlns:p="http://schemas.openxmlformats.org/presentationml/2006/main">
-  <p:cSld>
-    <p:spTree>
-      <p:nvGrpSpPr>
-        <p:cNvPr id="1" name=""/>
-        <p:cNvGrpSpPr/>
-        <p:nvPr/>
-      </p:nvGrpSpPr>
-      <p:grpSpPr>
-        <a:xfrm>
-          <a:off x="0" y="0"/>
-          <a:ext cx="0" cy="0"/>
-          <a:chOff x="0" y="0"/>
-          <a:chExt cx="0" cy="0"/>
-        </a:xfrm>
-      </p:grpSpPr>
-      <p:sp>
-        <p:nvSpPr>
-          <p:cNvPr id="2" name="Title 1"/>
-          <p:cNvSpPr>
-            <a:spLocks noGrp="1"/>
-          </p:cNvSpPr>
-          <p:nvPr>
-            <p:ph type="title"/>
-          </p:nvPr>
-        </p:nvSpPr>
-        <p:spPr/>
-        <p:txBody>
-          <a:bodyPr/>
-          <a:lstStyle/>
-          <a:p>
-            <a:r>
-              <a:rPr lang="en-GB" dirty="0" smtClean="0"/>
-              <a:t>THANK YOU</a:t>
-            </a:r>
-            <a:endParaRPr lang="en-GB" dirty="0"/>
-          </a:p>
-        </p:txBody>
-      </p:sp>
-      <p:sp>
-        <p:nvSpPr>
-          <p:cNvPr id="4" name="Content Placeholder 3"/>
-          <p:cNvSpPr>
-            <a:spLocks noGrp="1"/>
-          </p:cNvSpPr>
-          <p:nvPr>
-            <p:ph idx="21"/>
-          </p:nvPr>
-        </p:nvSpPr>
-        <p:spPr/>
-        <p:txBody>
-          <a:bodyPr/>
-          <a:lstStyle/>
-          <a:p>
-            <a:r>
-              <a:rPr lang="en-GB" dirty="0" smtClean="0"/>
-              <a:t>Hristina </a:t>
-            </a:r>
-            <a:r>
-              <a:rPr lang="en-GB" dirty="0" err="1" smtClean="0"/>
-              <a:t>nastevska</a:t>
-            </a:r>
-            <a:endParaRPr lang="en-GB" dirty="0"/>
-          </a:p>
-        </p:txBody>
-      </p:sp>
-      <p:sp>
-        <p:nvSpPr>
-          <p:cNvPr id="5" name="Content Placeholder 4"/>
-          <p:cNvSpPr>
-            <a:spLocks noGrp="1"/>
-          </p:cNvSpPr>
-          <p:nvPr>
-            <p:ph idx="22"/>
-          </p:nvPr>
-        </p:nvSpPr>
-        <p:spPr/>
-        <p:txBody>
-          <a:bodyPr/>
-          <a:lstStyle/>
-          <a:p>
-            <a:r>
-              <a:rPr lang="en-GB" dirty="0" smtClean="0"/>
-              <a:t>Hristina.Nastevska@endava.com</a:t>
-            </a:r>
-            <a:endParaRPr lang="en-GB" dirty="0"/>
-          </a:p>
-        </p:txBody>
-      </p:sp>
-      <p:sp>
-        <p:nvSpPr>
-          <p:cNvPr id="6" name="Content Placeholder 5"/>
-          <p:cNvSpPr>
-            <a:spLocks noGrp="1"/>
-          </p:cNvSpPr>
-          <p:nvPr>
-            <p:ph idx="23"/>
-          </p:nvPr>
-        </p:nvSpPr>
-        <p:spPr/>
-        <p:txBody>
-          <a:bodyPr>
-            <a:normAutofit lnSpcReduction="10000"/>
-          </a:bodyPr>
-          <a:lstStyle/>
-          <a:p>
-            <a:r>
-              <a:rPr lang="en-GB" dirty="0" smtClean="0"/>
-              <a:t>Developer</a:t>
-            </a:r>
-            <a:endParaRPr lang="en-GB" dirty="0"/>
-          </a:p>
-        </p:txBody>
-      </p:sp>
-    </p:spTree>
-    <p:extLst>
-      <p:ext uri="{BB962C8B-B14F-4D97-AF65-F5344CB8AC3E}">
-        <p14:creationId xmlns:p14="http://schemas.microsoft.com/office/powerpoint/2010/main" val="1048977810"/>
-      </p:ext>
-    </p:extLst>
-  </p:cSld>
-  <p:clrMapOvr>
-    <a:masterClrMapping/>
-  </p:clrMapOvr>
-  <p:timing>
-    <p:tnLst>
-      <p:par>
-        <p:cTn id="1" dur="indefinite" restart="never" nodeType="tmRoot"/>
-      </p:par>
-    </p:tnLst>
-  </p:timing>
-</p:sld>
-</file>
-
 <file path=ppt/slides/slide2.xml><?xml version="1.0" encoding="utf-8"?>
 <p:sld xmlns:a="http://schemas.openxmlformats.org/drawingml/2006/main" xmlns:r="http://schemas.openxmlformats.org/officeDocument/2006/relationships" xmlns:p="http://schemas.openxmlformats.org/presentationml/2006/main">
   <p:cSld>
@@ -14687,7 +16079,6 @@
               <a:rPr lang="en-US" dirty="0" smtClean="0"/>
               <a:t>Protractor and cucumber</a:t>
             </a:r>
-            <a:endParaRPr lang="en-US" dirty="0" smtClean="0"/>
           </a:p>
           <a:p>
             <a:r>
@@ -14750,6 +16141,515 @@
     <p:extLst>
       <p:ext uri="{BB962C8B-B14F-4D97-AF65-F5344CB8AC3E}">
         <p14:creationId xmlns:p14="http://schemas.microsoft.com/office/powerpoint/2010/main" val="3334839256"/>
+      </p:ext>
+    </p:extLst>
+  </p:cSld>
+  <p:clrMapOvr>
+    <a:masterClrMapping/>
+  </p:clrMapOvr>
+  <p:timing>
+    <p:tnLst>
+      <p:par>
+        <p:cTn id="1" dur="indefinite" restart="never" nodeType="tmRoot"/>
+      </p:par>
+    </p:tnLst>
+  </p:timing>
+</p:sld>
+</file>
+
+<file path=ppt/slides/slide20.xml><?xml version="1.0" encoding="utf-8"?>
+<p:sld xmlns:a="http://schemas.openxmlformats.org/drawingml/2006/main" xmlns:r="http://schemas.openxmlformats.org/officeDocument/2006/relationships" xmlns:p="http://schemas.openxmlformats.org/presentationml/2006/main">
+  <p:cSld>
+    <p:spTree>
+      <p:nvGrpSpPr>
+        <p:cNvPr id="1" name=""/>
+        <p:cNvGrpSpPr/>
+        <p:nvPr/>
+      </p:nvGrpSpPr>
+      <p:grpSpPr>
+        <a:xfrm>
+          <a:off x="0" y="0"/>
+          <a:ext cx="0" cy="0"/>
+          <a:chOff x="0" y="0"/>
+          <a:chExt cx="0" cy="0"/>
+        </a:xfrm>
+      </p:grpSpPr>
+      <p:sp>
+        <p:nvSpPr>
+          <p:cNvPr id="3" name="Title 2"/>
+          <p:cNvSpPr>
+            <a:spLocks noGrp="1"/>
+          </p:cNvSpPr>
+          <p:nvPr>
+            <p:ph type="title"/>
+          </p:nvPr>
+        </p:nvSpPr>
+        <p:spPr/>
+        <p:txBody>
+          <a:bodyPr/>
+          <a:lstStyle/>
+          <a:p>
+            <a:r>
+              <a:rPr lang="en-US" dirty="0" smtClean="0">
+                <a:solidFill>
+                  <a:srgbClr val="FF0000"/>
+                </a:solidFill>
+              </a:rPr>
+              <a:t>Example</a:t>
+            </a:r>
+            <a:endParaRPr lang="en-GB" dirty="0">
+              <a:solidFill>
+                <a:srgbClr val="FF0000"/>
+              </a:solidFill>
+            </a:endParaRPr>
+          </a:p>
+        </p:txBody>
+      </p:sp>
+      <p:sp>
+        <p:nvSpPr>
+          <p:cNvPr id="5" name="Content Placeholder 4"/>
+          <p:cNvSpPr>
+            <a:spLocks noGrp="1"/>
+          </p:cNvSpPr>
+          <p:nvPr>
+            <p:ph idx="13"/>
+          </p:nvPr>
+        </p:nvSpPr>
+        <p:spPr>
+          <a:xfrm>
+            <a:off x="806824" y="1958196"/>
+            <a:ext cx="10562792" cy="620683"/>
+          </a:xfrm>
+        </p:spPr>
+        <p:txBody>
+          <a:bodyPr/>
+          <a:lstStyle/>
+          <a:p>
+            <a:r>
+              <a:rPr lang="en-US" dirty="0" smtClean="0"/>
+              <a:t>Lets see the practical work in action….</a:t>
+            </a:r>
+          </a:p>
+          <a:p>
+            <a:endParaRPr lang="en-US" dirty="0"/>
+          </a:p>
+        </p:txBody>
+      </p:sp>
+    </p:spTree>
+    <p:extLst>
+      <p:ext uri="{BB962C8B-B14F-4D97-AF65-F5344CB8AC3E}">
+        <p14:creationId xmlns:p14="http://schemas.microsoft.com/office/powerpoint/2010/main" val="2848050199"/>
+      </p:ext>
+    </p:extLst>
+  </p:cSld>
+  <p:clrMapOvr>
+    <a:masterClrMapping/>
+  </p:clrMapOvr>
+  <p:timing>
+    <p:tnLst>
+      <p:par>
+        <p:cTn id="1" dur="indefinite" restart="never" nodeType="tmRoot"/>
+      </p:par>
+    </p:tnLst>
+  </p:timing>
+</p:sld>
+</file>
+
+<file path=ppt/slides/slide21.xml><?xml version="1.0" encoding="utf-8"?>
+<p:sld xmlns:a="http://schemas.openxmlformats.org/drawingml/2006/main" xmlns:r="http://schemas.openxmlformats.org/officeDocument/2006/relationships" xmlns:p="http://schemas.openxmlformats.org/presentationml/2006/main">
+  <p:cSld>
+    <p:spTree>
+      <p:nvGrpSpPr>
+        <p:cNvPr id="1" name=""/>
+        <p:cNvGrpSpPr/>
+        <p:nvPr/>
+      </p:nvGrpSpPr>
+      <p:grpSpPr>
+        <a:xfrm>
+          <a:off x="0" y="0"/>
+          <a:ext cx="0" cy="0"/>
+          <a:chOff x="0" y="0"/>
+          <a:chExt cx="0" cy="0"/>
+        </a:xfrm>
+      </p:grpSpPr>
+      <p:sp>
+        <p:nvSpPr>
+          <p:cNvPr id="3" name="Title 2"/>
+          <p:cNvSpPr>
+            <a:spLocks noGrp="1"/>
+          </p:cNvSpPr>
+          <p:nvPr>
+            <p:ph type="title"/>
+          </p:nvPr>
+        </p:nvSpPr>
+        <p:spPr/>
+        <p:txBody>
+          <a:bodyPr/>
+          <a:lstStyle/>
+          <a:p>
+            <a:r>
+              <a:rPr lang="en-US" dirty="0" smtClean="0">
+                <a:solidFill>
+                  <a:srgbClr val="FF0000"/>
+                </a:solidFill>
+              </a:rPr>
+              <a:t> Sources</a:t>
+            </a:r>
+            <a:endParaRPr lang="en-GB" dirty="0">
+              <a:solidFill>
+                <a:srgbClr val="FF0000"/>
+              </a:solidFill>
+            </a:endParaRPr>
+          </a:p>
+        </p:txBody>
+      </p:sp>
+      <p:sp>
+        <p:nvSpPr>
+          <p:cNvPr id="5" name="Content Placeholder 4"/>
+          <p:cNvSpPr>
+            <a:spLocks noGrp="1"/>
+          </p:cNvSpPr>
+          <p:nvPr>
+            <p:ph idx="13"/>
+          </p:nvPr>
+        </p:nvSpPr>
+        <p:spPr>
+          <a:xfrm>
+            <a:off x="845425" y="1595887"/>
+            <a:ext cx="10562792" cy="4750018"/>
+          </a:xfrm>
+        </p:spPr>
+        <p:txBody>
+          <a:bodyPr/>
+          <a:lstStyle/>
+          <a:p>
+            <a:r>
+              <a:rPr lang="en-US" b="1" dirty="0" smtClean="0"/>
+              <a:t>Protractor</a:t>
+            </a:r>
+            <a:r>
+              <a:rPr lang="en-US" sz="1200" b="1" dirty="0" smtClean="0"/>
+              <a:t>:</a:t>
+            </a:r>
+          </a:p>
+          <a:p>
+            <a:pPr marL="285750" indent="-285750">
+              <a:buFont typeface="Arial" panose="020B0604020202020204" pitchFamily="34" charset="0"/>
+              <a:buChar char="•"/>
+            </a:pPr>
+            <a:r>
+              <a:rPr lang="en-US" sz="1200" dirty="0">
+                <a:hlinkClick r:id="rId2"/>
+              </a:rPr>
+              <a:t>http://www.protractortest.org</a:t>
+            </a:r>
+            <a:r>
+              <a:rPr lang="en-US" sz="1200" dirty="0" smtClean="0">
+                <a:hlinkClick r:id="rId2"/>
+              </a:rPr>
+              <a:t>/#/</a:t>
+            </a:r>
+            <a:endParaRPr lang="en-US" sz="1200" dirty="0" smtClean="0"/>
+          </a:p>
+          <a:p>
+            <a:pPr marL="285750" indent="-285750">
+              <a:buFont typeface="Arial" panose="020B0604020202020204" pitchFamily="34" charset="0"/>
+              <a:buChar char="•"/>
+            </a:pPr>
+            <a:r>
+              <a:rPr lang="en-US" sz="1200" dirty="0">
+                <a:hlinkClick r:id="rId3"/>
+              </a:rPr>
+              <a:t>http://www.protractortest.org/#/</a:t>
+            </a:r>
+            <a:r>
+              <a:rPr lang="en-US" sz="1200" dirty="0" smtClean="0">
+                <a:hlinkClick r:id="rId3"/>
+              </a:rPr>
+              <a:t>api?view=webdriver.WebDriver.prototype.actions</a:t>
+            </a:r>
+            <a:endParaRPr lang="en-US" sz="1200" dirty="0" smtClean="0"/>
+          </a:p>
+          <a:p>
+            <a:pPr marL="285750" indent="-285750">
+              <a:buFont typeface="Arial" panose="020B0604020202020204" pitchFamily="34" charset="0"/>
+              <a:buChar char="•"/>
+            </a:pPr>
+            <a:r>
+              <a:rPr lang="en-US" sz="1200" dirty="0">
+                <a:hlinkClick r:id="rId4"/>
+              </a:rPr>
+              <a:t>https://</a:t>
+            </a:r>
+            <a:r>
+              <a:rPr lang="en-US" sz="1200" dirty="0" smtClean="0">
+                <a:hlinkClick r:id="rId4"/>
+              </a:rPr>
+              <a:t>www.thoughtworks.com/insights/blog/using-page-objects-overcome-protractors-shortcomings</a:t>
+            </a:r>
+            <a:endParaRPr lang="en-US" sz="1200" dirty="0" smtClean="0"/>
+          </a:p>
+          <a:p>
+            <a:endParaRPr lang="en-US" sz="1200" dirty="0" smtClean="0"/>
+          </a:p>
+          <a:p>
+            <a:pPr marL="285750" indent="-285750">
+              <a:buFont typeface="Arial" panose="020B0604020202020204" pitchFamily="34" charset="0"/>
+              <a:buChar char="•"/>
+            </a:pPr>
+            <a:endParaRPr lang="en-US" sz="1200" dirty="0" smtClean="0"/>
+          </a:p>
+          <a:p>
+            <a:r>
+              <a:rPr lang="en-US" sz="1200" b="1" dirty="0" smtClean="0"/>
+              <a:t>Java Script:</a:t>
+            </a:r>
+          </a:p>
+          <a:p>
+            <a:pPr marL="285750" indent="-285750">
+              <a:buFont typeface="Arial" panose="020B0604020202020204" pitchFamily="34" charset="0"/>
+              <a:buChar char="•"/>
+            </a:pPr>
+            <a:r>
+              <a:rPr lang="en-US" sz="1200" dirty="0">
+                <a:hlinkClick r:id="rId5"/>
+              </a:rPr>
+              <a:t>https://code.tutsplus.com/tutorials/how-to-use-map-filter-reduce-in-javascript--</a:t>
+            </a:r>
+            <a:r>
+              <a:rPr lang="en-US" sz="1200" dirty="0" smtClean="0">
+                <a:hlinkClick r:id="rId5"/>
+              </a:rPr>
+              <a:t>cms-26209</a:t>
+            </a:r>
+            <a:endParaRPr lang="en-US" sz="1200" dirty="0" smtClean="0"/>
+          </a:p>
+          <a:p>
+            <a:pPr marL="285750" indent="-285750">
+              <a:buFont typeface="Arial" panose="020B0604020202020204" pitchFamily="34" charset="0"/>
+              <a:buChar char="•"/>
+            </a:pPr>
+            <a:r>
+              <a:rPr lang="en-US" sz="1200" b="1" dirty="0" smtClean="0">
+                <a:solidFill>
+                  <a:srgbClr val="FF0000"/>
+                </a:solidFill>
+              </a:rPr>
+              <a:t>Secrets of the JavaScript Ninja SECOND EDITION – Generators And Promises</a:t>
+            </a:r>
+          </a:p>
+          <a:p>
+            <a:pPr marL="285750" indent="-285750">
+              <a:buFont typeface="Arial" panose="020B0604020202020204" pitchFamily="34" charset="0"/>
+              <a:buChar char="•"/>
+            </a:pPr>
+            <a:r>
+              <a:rPr lang="en-US" sz="1200" b="1" dirty="0">
+                <a:solidFill>
+                  <a:srgbClr val="FF0000"/>
+                </a:solidFill>
+                <a:hlinkClick r:id="rId6"/>
+              </a:rPr>
+              <a:t>https://www.sitepoint.com/asynchronous-apis-using-fetch-api-es6-generators</a:t>
+            </a:r>
+            <a:r>
+              <a:rPr lang="en-US" sz="1200" b="1" dirty="0" smtClean="0">
+                <a:solidFill>
+                  <a:srgbClr val="FF0000"/>
+                </a:solidFill>
+                <a:hlinkClick r:id="rId6"/>
+              </a:rPr>
+              <a:t>/</a:t>
+            </a:r>
+            <a:endParaRPr lang="en-US" sz="1200" b="1" dirty="0">
+              <a:solidFill>
+                <a:srgbClr val="FF0000"/>
+              </a:solidFill>
+            </a:endParaRPr>
+          </a:p>
+          <a:p>
+            <a:r>
+              <a:rPr lang="en-US" sz="1200" b="1" dirty="0" err="1" smtClean="0"/>
+              <a:t>CucumberJS</a:t>
+            </a:r>
+            <a:r>
+              <a:rPr lang="en-US" sz="1200" b="1" dirty="0" smtClean="0"/>
+              <a:t> + Protractor</a:t>
+            </a:r>
+          </a:p>
+          <a:p>
+            <a:pPr marL="171450" indent="-171450">
+              <a:buFont typeface="Arial" panose="020B0604020202020204" pitchFamily="34" charset="0"/>
+              <a:buChar char="•"/>
+            </a:pPr>
+            <a:r>
+              <a:rPr lang="en-US" sz="1200" b="1" dirty="0">
+                <a:hlinkClick r:id="rId7"/>
+              </a:rPr>
+              <a:t>https://</a:t>
+            </a:r>
+            <a:r>
+              <a:rPr lang="en-US" sz="1200" b="1" dirty="0" smtClean="0">
+                <a:hlinkClick r:id="rId7"/>
+              </a:rPr>
+              <a:t>semaphoreci.com/community/tutorials/getting-started-with-protractor-and-cucumber</a:t>
+            </a:r>
+            <a:endParaRPr lang="en-US" sz="1200" b="1" dirty="0" smtClean="0"/>
+          </a:p>
+          <a:p>
+            <a:pPr marL="171450" indent="-171450">
+              <a:buFont typeface="Arial" panose="020B0604020202020204" pitchFamily="34" charset="0"/>
+              <a:buChar char="•"/>
+            </a:pPr>
+            <a:endParaRPr lang="en-US" sz="1200" b="1" dirty="0"/>
+          </a:p>
+          <a:p>
+            <a:endParaRPr lang="en-US" dirty="0" smtClean="0"/>
+          </a:p>
+          <a:p>
+            <a:endParaRPr lang="en-US" dirty="0"/>
+          </a:p>
+        </p:txBody>
+      </p:sp>
+    </p:spTree>
+    <p:extLst>
+      <p:ext uri="{BB962C8B-B14F-4D97-AF65-F5344CB8AC3E}">
+        <p14:creationId xmlns:p14="http://schemas.microsoft.com/office/powerpoint/2010/main" val="3004802942"/>
+      </p:ext>
+    </p:extLst>
+  </p:cSld>
+  <p:clrMapOvr>
+    <a:masterClrMapping/>
+  </p:clrMapOvr>
+  <p:timing>
+    <p:tnLst>
+      <p:par>
+        <p:cTn id="1" dur="indefinite" restart="never" nodeType="tmRoot"/>
+      </p:par>
+    </p:tnLst>
+  </p:timing>
+</p:sld>
+</file>
+
+<file path=ppt/slides/slide22.xml><?xml version="1.0" encoding="utf-8"?>
+<p:sld xmlns:a="http://schemas.openxmlformats.org/drawingml/2006/main" xmlns:r="http://schemas.openxmlformats.org/officeDocument/2006/relationships" xmlns:p="http://schemas.openxmlformats.org/presentationml/2006/main">
+  <p:cSld>
+    <p:spTree>
+      <p:nvGrpSpPr>
+        <p:cNvPr id="1" name=""/>
+        <p:cNvGrpSpPr/>
+        <p:nvPr/>
+      </p:nvGrpSpPr>
+      <p:grpSpPr>
+        <a:xfrm>
+          <a:off x="0" y="0"/>
+          <a:ext cx="0" cy="0"/>
+          <a:chOff x="0" y="0"/>
+          <a:chExt cx="0" cy="0"/>
+        </a:xfrm>
+      </p:grpSpPr>
+      <p:sp>
+        <p:nvSpPr>
+          <p:cNvPr id="2" name="Title 1"/>
+          <p:cNvSpPr>
+            <a:spLocks noGrp="1"/>
+          </p:cNvSpPr>
+          <p:nvPr>
+            <p:ph type="title"/>
+          </p:nvPr>
+        </p:nvSpPr>
+        <p:spPr/>
+        <p:txBody>
+          <a:bodyPr/>
+          <a:lstStyle/>
+          <a:p>
+            <a:r>
+              <a:rPr lang="en-GB" dirty="0" smtClean="0"/>
+              <a:t>THANK YOU</a:t>
+            </a:r>
+            <a:endParaRPr lang="en-GB" dirty="0"/>
+          </a:p>
+        </p:txBody>
+      </p:sp>
+      <p:sp>
+        <p:nvSpPr>
+          <p:cNvPr id="4" name="Content Placeholder 3"/>
+          <p:cNvSpPr>
+            <a:spLocks noGrp="1"/>
+          </p:cNvSpPr>
+          <p:nvPr>
+            <p:ph idx="21"/>
+          </p:nvPr>
+        </p:nvSpPr>
+        <p:spPr/>
+        <p:txBody>
+          <a:bodyPr/>
+          <a:lstStyle/>
+          <a:p>
+            <a:r>
+              <a:rPr lang="en-GB" dirty="0" smtClean="0"/>
+              <a:t>Hristina </a:t>
+            </a:r>
+            <a:r>
+              <a:rPr lang="en-GB" dirty="0" err="1" smtClean="0"/>
+              <a:t>nastevska</a:t>
+            </a:r>
+            <a:endParaRPr lang="en-GB" dirty="0"/>
+          </a:p>
+        </p:txBody>
+      </p:sp>
+      <p:sp>
+        <p:nvSpPr>
+          <p:cNvPr id="5" name="Content Placeholder 4"/>
+          <p:cNvSpPr>
+            <a:spLocks noGrp="1"/>
+          </p:cNvSpPr>
+          <p:nvPr>
+            <p:ph idx="22"/>
+          </p:nvPr>
+        </p:nvSpPr>
+        <p:spPr/>
+        <p:txBody>
+          <a:bodyPr/>
+          <a:lstStyle/>
+          <a:p>
+            <a:r>
+              <a:rPr lang="en-GB" dirty="0" smtClean="0"/>
+              <a:t>Hristina.Nastevska@endava.com</a:t>
+            </a:r>
+            <a:endParaRPr lang="en-GB" dirty="0"/>
+          </a:p>
+        </p:txBody>
+      </p:sp>
+      <p:sp>
+        <p:nvSpPr>
+          <p:cNvPr id="6" name="Content Placeholder 5"/>
+          <p:cNvSpPr>
+            <a:spLocks noGrp="1"/>
+          </p:cNvSpPr>
+          <p:nvPr>
+            <p:ph idx="23"/>
+          </p:nvPr>
+        </p:nvSpPr>
+        <p:spPr/>
+        <p:txBody>
+          <a:bodyPr>
+            <a:normAutofit lnSpcReduction="10000"/>
+          </a:bodyPr>
+          <a:lstStyle/>
+          <a:p>
+            <a:r>
+              <a:rPr lang="en-GB" dirty="0" smtClean="0"/>
+              <a:t>Developer</a:t>
+            </a:r>
+            <a:endParaRPr lang="en-GB" dirty="0"/>
+          </a:p>
+        </p:txBody>
+      </p:sp>
+    </p:spTree>
+    <p:extLst>
+      <p:ext uri="{BB962C8B-B14F-4D97-AF65-F5344CB8AC3E}">
+        <p14:creationId xmlns:p14="http://schemas.microsoft.com/office/powerpoint/2010/main" val="1048977810"/>
       </p:ext>
     </p:extLst>
   </p:cSld>
@@ -14892,17 +16792,12 @@
             </a:r>
             <a:r>
               <a:rPr lang="en-US" dirty="0"/>
-              <a:t>you use in your suite. </a:t>
-            </a:r>
-            <a:r>
-              <a:rPr lang="en-US" dirty="0"/>
-              <a:t>	 </a:t>
+              <a:t>you use in your suite. 	 </a:t>
             </a:r>
             <a:r>
               <a:rPr lang="en-US" dirty="0" smtClean="0"/>
               <a:t>  </a:t>
             </a:r>
-            <a:endParaRPr lang="en-US" dirty="0" smtClean="0"/>
           </a:p>
           <a:p>
             <a:pPr marL="285750" indent="-285750" algn="l">
@@ -14927,7 +16822,6 @@
               <a:rPr lang="en-US" dirty="0"/>
               <a:t> frameworks like Cucumber into your workflow.</a:t>
             </a:r>
-            <a:endParaRPr lang="en-US" dirty="0"/>
           </a:p>
         </p:txBody>
       </p:sp>

</xml_diff>